<commit_message>
Update Personal Practical Cybersecurity.pptx
</commit_message>
<xml_diff>
--- a/Personal Practical Cybersecurity/Personal Practical Cybersecurity.pptx
+++ b/Personal Practical Cybersecurity/Personal Practical Cybersecurity.pptx
@@ -7,13 +7,13 @@
   <p:sldIdLst>
     <p:sldId id="256" r:id="rId2"/>
     <p:sldId id="260" r:id="rId3"/>
-    <p:sldId id="281" r:id="rId4"/>
-    <p:sldId id="280" r:id="rId5"/>
-    <p:sldId id="282" r:id="rId6"/>
-    <p:sldId id="261" r:id="rId7"/>
-    <p:sldId id="287" r:id="rId8"/>
-    <p:sldId id="268" r:id="rId9"/>
-    <p:sldId id="264" r:id="rId10"/>
+    <p:sldId id="280" r:id="rId4"/>
+    <p:sldId id="282" r:id="rId5"/>
+    <p:sldId id="261" r:id="rId6"/>
+    <p:sldId id="287" r:id="rId7"/>
+    <p:sldId id="268" r:id="rId8"/>
+    <p:sldId id="264" r:id="rId9"/>
+    <p:sldId id="289" r:id="rId10"/>
     <p:sldId id="265" r:id="rId11"/>
     <p:sldId id="259" r:id="rId12"/>
     <p:sldId id="278" r:id="rId13"/>
@@ -131,13 +131,18 @@
       </a:defRPr>
     </a:lvl9pPr>
   </p:defaultTextStyle>
+  <p:extLst>
+    <p:ext uri="{EFAFB233-063F-42B5-8137-9DF3F51BA10A}">
+      <p15:sldGuideLst xmlns:p15="http://schemas.microsoft.com/office/powerpoint/2012/main"/>
+    </p:ext>
+  </p:extLst>
 </p:presentation>
 </file>
 
 <file path=ppt/revisionInfo.xml><?xml version="1.0" encoding="utf-8"?>
 <p1510:revInfo xmlns:a="http://schemas.openxmlformats.org/drawingml/2006/main" xmlns:r="http://schemas.openxmlformats.org/officeDocument/2006/relationships" xmlns:p1510="http://schemas.microsoft.com/office/powerpoint/2015/10/main">
   <p1510:revLst>
-    <p1510:client id="{661F648E-E2FA-44A4-A62C-A104C39D23A7}" v="5" dt="2019-06-27T23:40:54.373"/>
+    <p1510:client id="{21780EC7-48F1-479C-B262-47D82C4FC68B}" v="23" dt="2019-07-01T23:21:25.782"/>
   </p1510:revLst>
 </p1510:revInfo>
 </file>
@@ -342,6 +347,370 @@
       </pc:sldChg>
     </pc:docChg>
   </pc:docChgLst>
+  <pc:docChgLst>
+    <pc:chgData name="william a" userId="c66c7249b60d4ab2" providerId="LiveId" clId="{21780EC7-48F1-479C-B262-47D82C4FC68B}"/>
+    <pc:docChg chg="undo redo custSel addSld delSld modSld">
+      <pc:chgData name="william a" userId="c66c7249b60d4ab2" providerId="LiveId" clId="{21780EC7-48F1-479C-B262-47D82C4FC68B}" dt="2019-07-02T00:09:09.380" v="1061" actId="113"/>
+      <pc:docMkLst>
+        <pc:docMk/>
+      </pc:docMkLst>
+      <pc:sldChg chg="modSp">
+        <pc:chgData name="william a" userId="c66c7249b60d4ab2" providerId="LiveId" clId="{21780EC7-48F1-479C-B262-47D82C4FC68B}" dt="2019-07-01T23:56:55.475" v="1060" actId="113"/>
+        <pc:sldMkLst>
+          <pc:docMk/>
+          <pc:sldMk cId="1854012467" sldId="259"/>
+        </pc:sldMkLst>
+        <pc:spChg chg="mod">
+          <ac:chgData name="william a" userId="c66c7249b60d4ab2" providerId="LiveId" clId="{21780EC7-48F1-479C-B262-47D82C4FC68B}" dt="2019-07-01T23:56:55.475" v="1060" actId="113"/>
+          <ac:spMkLst>
+            <pc:docMk/>
+            <pc:sldMk cId="1854012467" sldId="259"/>
+            <ac:spMk id="3" creationId="{65B32B1F-E0DF-456C-B7E0-F6CB2CBEA651}"/>
+          </ac:spMkLst>
+        </pc:spChg>
+      </pc:sldChg>
+      <pc:sldChg chg="modSp">
+        <pc:chgData name="william a" userId="c66c7249b60d4ab2" providerId="LiveId" clId="{21780EC7-48F1-479C-B262-47D82C4FC68B}" dt="2019-07-01T22:34:55.157" v="49" actId="20577"/>
+        <pc:sldMkLst>
+          <pc:docMk/>
+          <pc:sldMk cId="3987729892" sldId="261"/>
+        </pc:sldMkLst>
+        <pc:spChg chg="mod">
+          <ac:chgData name="william a" userId="c66c7249b60d4ab2" providerId="LiveId" clId="{21780EC7-48F1-479C-B262-47D82C4FC68B}" dt="2019-07-01T22:34:55.157" v="49" actId="20577"/>
+          <ac:spMkLst>
+            <pc:docMk/>
+            <pc:sldMk cId="3987729892" sldId="261"/>
+            <ac:spMk id="3" creationId="{65B32B1F-E0DF-456C-B7E0-F6CB2CBEA651}"/>
+          </ac:spMkLst>
+        </pc:spChg>
+      </pc:sldChg>
+      <pc:sldChg chg="modSp">
+        <pc:chgData name="william a" userId="c66c7249b60d4ab2" providerId="LiveId" clId="{21780EC7-48F1-479C-B262-47D82C4FC68B}" dt="2019-07-01T23:03:53.373" v="368" actId="27636"/>
+        <pc:sldMkLst>
+          <pc:docMk/>
+          <pc:sldMk cId="2363797164" sldId="264"/>
+        </pc:sldMkLst>
+        <pc:spChg chg="mod">
+          <ac:chgData name="william a" userId="c66c7249b60d4ab2" providerId="LiveId" clId="{21780EC7-48F1-479C-B262-47D82C4FC68B}" dt="2019-07-01T23:03:53.373" v="368" actId="27636"/>
+          <ac:spMkLst>
+            <pc:docMk/>
+            <pc:sldMk cId="2363797164" sldId="264"/>
+            <ac:spMk id="3" creationId="{65B32B1F-E0DF-456C-B7E0-F6CB2CBEA651}"/>
+          </ac:spMkLst>
+        </pc:spChg>
+      </pc:sldChg>
+      <pc:sldChg chg="modSp">
+        <pc:chgData name="william a" userId="c66c7249b60d4ab2" providerId="LiveId" clId="{21780EC7-48F1-479C-B262-47D82C4FC68B}" dt="2019-07-01T23:06:29.431" v="617" actId="20577"/>
+        <pc:sldMkLst>
+          <pc:docMk/>
+          <pc:sldMk cId="3846503020" sldId="265"/>
+        </pc:sldMkLst>
+        <pc:spChg chg="mod">
+          <ac:chgData name="william a" userId="c66c7249b60d4ab2" providerId="LiveId" clId="{21780EC7-48F1-479C-B262-47D82C4FC68B}" dt="2019-07-01T23:06:29.431" v="617" actId="20577"/>
+          <ac:spMkLst>
+            <pc:docMk/>
+            <pc:sldMk cId="3846503020" sldId="265"/>
+            <ac:spMk id="3" creationId="{65B32B1F-E0DF-456C-B7E0-F6CB2CBEA651}"/>
+          </ac:spMkLst>
+        </pc:spChg>
+      </pc:sldChg>
+      <pc:sldChg chg="addSp delSp modSp">
+        <pc:chgData name="william a" userId="c66c7249b60d4ab2" providerId="LiveId" clId="{21780EC7-48F1-479C-B262-47D82C4FC68B}" dt="2019-07-01T23:08:48.131" v="855" actId="1076"/>
+        <pc:sldMkLst>
+          <pc:docMk/>
+          <pc:sldMk cId="2920234693" sldId="266"/>
+        </pc:sldMkLst>
+        <pc:picChg chg="add del mod">
+          <ac:chgData name="william a" userId="c66c7249b60d4ab2" providerId="LiveId" clId="{21780EC7-48F1-479C-B262-47D82C4FC68B}" dt="2019-07-01T22:36:10.257" v="62" actId="478"/>
+          <ac:picMkLst>
+            <pc:docMk/>
+            <pc:sldMk cId="2920234693" sldId="266"/>
+            <ac:picMk id="4" creationId="{C8B538B1-3147-4D95-AADF-0D0E7E2B6519}"/>
+          </ac:picMkLst>
+        </pc:picChg>
+        <pc:picChg chg="add mod">
+          <ac:chgData name="william a" userId="c66c7249b60d4ab2" providerId="LiveId" clId="{21780EC7-48F1-479C-B262-47D82C4FC68B}" dt="2019-07-01T23:08:48.131" v="855" actId="1076"/>
+          <ac:picMkLst>
+            <pc:docMk/>
+            <pc:sldMk cId="2920234693" sldId="266"/>
+            <ac:picMk id="5" creationId="{BBA9C656-6F70-4925-8B8A-69B65FA112C7}"/>
+          </ac:picMkLst>
+        </pc:picChg>
+        <pc:picChg chg="mod">
+          <ac:chgData name="william a" userId="c66c7249b60d4ab2" providerId="LiveId" clId="{21780EC7-48F1-479C-B262-47D82C4FC68B}" dt="2019-07-01T23:08:46.707" v="854" actId="1076"/>
+          <ac:picMkLst>
+            <pc:docMk/>
+            <pc:sldMk cId="2920234693" sldId="266"/>
+            <ac:picMk id="6" creationId="{A1E34164-E89A-417F-9FA3-9AC0F86AFD3C}"/>
+          </ac:picMkLst>
+        </pc:picChg>
+      </pc:sldChg>
+      <pc:sldChg chg="addSp modSp">
+        <pc:chgData name="william a" userId="c66c7249b60d4ab2" providerId="LiveId" clId="{21780EC7-48F1-479C-B262-47D82C4FC68B}" dt="2019-07-01T22:36:39.993" v="88" actId="207"/>
+        <pc:sldMkLst>
+          <pc:docMk/>
+          <pc:sldMk cId="556003552" sldId="267"/>
+        </pc:sldMkLst>
+        <pc:spChg chg="add mod">
+          <ac:chgData name="william a" userId="c66c7249b60d4ab2" providerId="LiveId" clId="{21780EC7-48F1-479C-B262-47D82C4FC68B}" dt="2019-07-01T22:36:39.993" v="88" actId="207"/>
+          <ac:spMkLst>
+            <pc:docMk/>
+            <pc:sldMk cId="556003552" sldId="267"/>
+            <ac:spMk id="5" creationId="{FA2E4623-825E-45DB-AF79-765BC674D041}"/>
+          </ac:spMkLst>
+        </pc:spChg>
+      </pc:sldChg>
+      <pc:sldChg chg="modSp">
+        <pc:chgData name="william a" userId="c66c7249b60d4ab2" providerId="LiveId" clId="{21780EC7-48F1-479C-B262-47D82C4FC68B}" dt="2019-07-01T23:09:20.159" v="857" actId="27636"/>
+        <pc:sldMkLst>
+          <pc:docMk/>
+          <pc:sldMk cId="3852182217" sldId="269"/>
+        </pc:sldMkLst>
+        <pc:spChg chg="mod">
+          <ac:chgData name="william a" userId="c66c7249b60d4ab2" providerId="LiveId" clId="{21780EC7-48F1-479C-B262-47D82C4FC68B}" dt="2019-07-01T23:09:20.159" v="857" actId="27636"/>
+          <ac:spMkLst>
+            <pc:docMk/>
+            <pc:sldMk cId="3852182217" sldId="269"/>
+            <ac:spMk id="3" creationId="{65B32B1F-E0DF-456C-B7E0-F6CB2CBEA651}"/>
+          </ac:spMkLst>
+        </pc:spChg>
+      </pc:sldChg>
+      <pc:sldChg chg="modSp">
+        <pc:chgData name="william a" userId="c66c7249b60d4ab2" providerId="LiveId" clId="{21780EC7-48F1-479C-B262-47D82C4FC68B}" dt="2019-07-01T23:10:05.241" v="935" actId="27636"/>
+        <pc:sldMkLst>
+          <pc:docMk/>
+          <pc:sldMk cId="3332906769" sldId="270"/>
+        </pc:sldMkLst>
+        <pc:spChg chg="mod">
+          <ac:chgData name="william a" userId="c66c7249b60d4ab2" providerId="LiveId" clId="{21780EC7-48F1-479C-B262-47D82C4FC68B}" dt="2019-07-01T23:10:05.241" v="935" actId="27636"/>
+          <ac:spMkLst>
+            <pc:docMk/>
+            <pc:sldMk cId="3332906769" sldId="270"/>
+            <ac:spMk id="3" creationId="{65B32B1F-E0DF-456C-B7E0-F6CB2CBEA651}"/>
+          </ac:spMkLst>
+        </pc:spChg>
+      </pc:sldChg>
+      <pc:sldChg chg="modSp">
+        <pc:chgData name="william a" userId="c66c7249b60d4ab2" providerId="LiveId" clId="{21780EC7-48F1-479C-B262-47D82C4FC68B}" dt="2019-07-02T00:09:09.380" v="1061" actId="113"/>
+        <pc:sldMkLst>
+          <pc:docMk/>
+          <pc:sldMk cId="1502653849" sldId="271"/>
+        </pc:sldMkLst>
+        <pc:spChg chg="mod">
+          <ac:chgData name="william a" userId="c66c7249b60d4ab2" providerId="LiveId" clId="{21780EC7-48F1-479C-B262-47D82C4FC68B}" dt="2019-07-02T00:09:09.380" v="1061" actId="113"/>
+          <ac:spMkLst>
+            <pc:docMk/>
+            <pc:sldMk cId="1502653849" sldId="271"/>
+            <ac:spMk id="3" creationId="{65B32B1F-E0DF-456C-B7E0-F6CB2CBEA651}"/>
+          </ac:spMkLst>
+        </pc:spChg>
+      </pc:sldChg>
+      <pc:sldChg chg="modSp">
+        <pc:chgData name="william a" userId="c66c7249b60d4ab2" providerId="LiveId" clId="{21780EC7-48F1-479C-B262-47D82C4FC68B}" dt="2019-07-01T23:21:51.544" v="1055" actId="27636"/>
+        <pc:sldMkLst>
+          <pc:docMk/>
+          <pc:sldMk cId="2070803440" sldId="273"/>
+        </pc:sldMkLst>
+        <pc:spChg chg="mod">
+          <ac:chgData name="william a" userId="c66c7249b60d4ab2" providerId="LiveId" clId="{21780EC7-48F1-479C-B262-47D82C4FC68B}" dt="2019-07-01T23:21:35.445" v="1046" actId="27636"/>
+          <ac:spMkLst>
+            <pc:docMk/>
+            <pc:sldMk cId="2070803440" sldId="273"/>
+            <ac:spMk id="2" creationId="{D0CBD092-444D-485B-B077-AE37DB7967F1}"/>
+          </ac:spMkLst>
+        </pc:spChg>
+        <pc:spChg chg="mod">
+          <ac:chgData name="william a" userId="c66c7249b60d4ab2" providerId="LiveId" clId="{21780EC7-48F1-479C-B262-47D82C4FC68B}" dt="2019-07-01T23:21:51.544" v="1055" actId="27636"/>
+          <ac:spMkLst>
+            <pc:docMk/>
+            <pc:sldMk cId="2070803440" sldId="273"/>
+            <ac:spMk id="3" creationId="{65B32B1F-E0DF-456C-B7E0-F6CB2CBEA651}"/>
+          </ac:spMkLst>
+        </pc:spChg>
+      </pc:sldChg>
+      <pc:sldChg chg="delSp modSp">
+        <pc:chgData name="william a" userId="c66c7249b60d4ab2" providerId="LiveId" clId="{21780EC7-48F1-479C-B262-47D82C4FC68B}" dt="2019-07-01T23:11:18.504" v="992" actId="6549"/>
+        <pc:sldMkLst>
+          <pc:docMk/>
+          <pc:sldMk cId="1563484399" sldId="275"/>
+        </pc:sldMkLst>
+        <pc:spChg chg="mod">
+          <ac:chgData name="william a" userId="c66c7249b60d4ab2" providerId="LiveId" clId="{21780EC7-48F1-479C-B262-47D82C4FC68B}" dt="2019-07-01T23:11:18.504" v="992" actId="6549"/>
+          <ac:spMkLst>
+            <pc:docMk/>
+            <pc:sldMk cId="1563484399" sldId="275"/>
+            <ac:spMk id="3" creationId="{65B32B1F-E0DF-456C-B7E0-F6CB2CBEA651}"/>
+          </ac:spMkLst>
+        </pc:spChg>
+        <pc:picChg chg="del">
+          <ac:chgData name="william a" userId="c66c7249b60d4ab2" providerId="LiveId" clId="{21780EC7-48F1-479C-B262-47D82C4FC68B}" dt="2019-07-01T23:10:42.869" v="939" actId="478"/>
+          <ac:picMkLst>
+            <pc:docMk/>
+            <pc:sldMk cId="1563484399" sldId="275"/>
+            <ac:picMk id="4" creationId="{527CAA44-A937-40D3-B043-FCEC4D0BAC55}"/>
+          </ac:picMkLst>
+        </pc:picChg>
+        <pc:picChg chg="mod">
+          <ac:chgData name="william a" userId="c66c7249b60d4ab2" providerId="LiveId" clId="{21780EC7-48F1-479C-B262-47D82C4FC68B}" dt="2019-07-01T23:10:46.581" v="941" actId="1076"/>
+          <ac:picMkLst>
+            <pc:docMk/>
+            <pc:sldMk cId="1563484399" sldId="275"/>
+            <ac:picMk id="2052" creationId="{38A17F82-4959-4FFC-9445-B78283285E49}"/>
+          </ac:picMkLst>
+        </pc:picChg>
+      </pc:sldChg>
+      <pc:sldChg chg="modSp">
+        <pc:chgData name="william a" userId="c66c7249b60d4ab2" providerId="LiveId" clId="{21780EC7-48F1-479C-B262-47D82C4FC68B}" dt="2019-07-01T23:11:47.911" v="1003" actId="404"/>
+        <pc:sldMkLst>
+          <pc:docMk/>
+          <pc:sldMk cId="2415589479" sldId="276"/>
+        </pc:sldMkLst>
+        <pc:spChg chg="mod">
+          <ac:chgData name="william a" userId="c66c7249b60d4ab2" providerId="LiveId" clId="{21780EC7-48F1-479C-B262-47D82C4FC68B}" dt="2019-07-01T23:11:47.911" v="1003" actId="404"/>
+          <ac:spMkLst>
+            <pc:docMk/>
+            <pc:sldMk cId="2415589479" sldId="276"/>
+            <ac:spMk id="3" creationId="{65B32B1F-E0DF-456C-B7E0-F6CB2CBEA651}"/>
+          </ac:spMkLst>
+        </pc:spChg>
+      </pc:sldChg>
+      <pc:sldChg chg="modSp">
+        <pc:chgData name="william a" userId="c66c7249b60d4ab2" providerId="LiveId" clId="{21780EC7-48F1-479C-B262-47D82C4FC68B}" dt="2019-07-01T23:11:01.272" v="953" actId="20577"/>
+        <pc:sldMkLst>
+          <pc:docMk/>
+          <pc:sldMk cId="3698211945" sldId="277"/>
+        </pc:sldMkLst>
+        <pc:spChg chg="mod">
+          <ac:chgData name="william a" userId="c66c7249b60d4ab2" providerId="LiveId" clId="{21780EC7-48F1-479C-B262-47D82C4FC68B}" dt="2019-07-01T23:11:01.272" v="953" actId="20577"/>
+          <ac:spMkLst>
+            <pc:docMk/>
+            <pc:sldMk cId="3698211945" sldId="277"/>
+            <ac:spMk id="3" creationId="{65B32B1F-E0DF-456C-B7E0-F6CB2CBEA651}"/>
+          </ac:spMkLst>
+        </pc:spChg>
+      </pc:sldChg>
+      <pc:sldChg chg="modSp">
+        <pc:chgData name="william a" userId="c66c7249b60d4ab2" providerId="LiveId" clId="{21780EC7-48F1-479C-B262-47D82C4FC68B}" dt="2019-07-01T23:56:39.429" v="1058" actId="113"/>
+        <pc:sldMkLst>
+          <pc:docMk/>
+          <pc:sldMk cId="2949025550" sldId="278"/>
+        </pc:sldMkLst>
+        <pc:spChg chg="mod">
+          <ac:chgData name="william a" userId="c66c7249b60d4ab2" providerId="LiveId" clId="{21780EC7-48F1-479C-B262-47D82C4FC68B}" dt="2019-07-01T23:56:39.429" v="1058" actId="113"/>
+          <ac:spMkLst>
+            <pc:docMk/>
+            <pc:sldMk cId="2949025550" sldId="278"/>
+            <ac:spMk id="3" creationId="{65B32B1F-E0DF-456C-B7E0-F6CB2CBEA651}"/>
+          </ac:spMkLst>
+        </pc:spChg>
+      </pc:sldChg>
+      <pc:sldChg chg="modSp">
+        <pc:chgData name="william a" userId="c66c7249b60d4ab2" providerId="LiveId" clId="{21780EC7-48F1-479C-B262-47D82C4FC68B}" dt="2019-07-01T23:08:34.439" v="853" actId="403"/>
+        <pc:sldMkLst>
+          <pc:docMk/>
+          <pc:sldMk cId="24948884" sldId="279"/>
+        </pc:sldMkLst>
+        <pc:spChg chg="mod">
+          <ac:chgData name="william a" userId="c66c7249b60d4ab2" providerId="LiveId" clId="{21780EC7-48F1-479C-B262-47D82C4FC68B}" dt="2019-07-01T23:08:34.439" v="853" actId="403"/>
+          <ac:spMkLst>
+            <pc:docMk/>
+            <pc:sldMk cId="24948884" sldId="279"/>
+            <ac:spMk id="3" creationId="{65B32B1F-E0DF-456C-B7E0-F6CB2CBEA651}"/>
+          </ac:spMkLst>
+        </pc:spChg>
+      </pc:sldChg>
+      <pc:sldChg chg="del">
+        <pc:chgData name="william a" userId="c66c7249b60d4ab2" providerId="LiveId" clId="{21780EC7-48F1-479C-B262-47D82C4FC68B}" dt="2019-07-01T22:34:28.684" v="0" actId="2696"/>
+        <pc:sldMkLst>
+          <pc:docMk/>
+          <pc:sldMk cId="3167071335" sldId="281"/>
+        </pc:sldMkLst>
+      </pc:sldChg>
+      <pc:sldChg chg="addSp modSp">
+        <pc:chgData name="william a" userId="c66c7249b60d4ab2" providerId="LiveId" clId="{21780EC7-48F1-479C-B262-47D82C4FC68B}" dt="2019-07-01T23:11:27.078" v="1000" actId="20577"/>
+        <pc:sldMkLst>
+          <pc:docMk/>
+          <pc:sldMk cId="2552255179" sldId="284"/>
+        </pc:sldMkLst>
+        <pc:spChg chg="mod">
+          <ac:chgData name="william a" userId="c66c7249b60d4ab2" providerId="LiveId" clId="{21780EC7-48F1-479C-B262-47D82C4FC68B}" dt="2019-07-01T23:11:27.078" v="1000" actId="20577"/>
+          <ac:spMkLst>
+            <pc:docMk/>
+            <pc:sldMk cId="2552255179" sldId="284"/>
+            <ac:spMk id="3" creationId="{65B32B1F-E0DF-456C-B7E0-F6CB2CBEA651}"/>
+          </ac:spMkLst>
+        </pc:spChg>
+        <pc:picChg chg="add mod">
+          <ac:chgData name="william a" userId="c66c7249b60d4ab2" providerId="LiveId" clId="{21780EC7-48F1-479C-B262-47D82C4FC68B}" dt="2019-07-01T23:02:22.635" v="151" actId="1076"/>
+          <ac:picMkLst>
+            <pc:docMk/>
+            <pc:sldMk cId="2552255179" sldId="284"/>
+            <ac:picMk id="4" creationId="{BFB227FF-08F1-47EB-81AF-177D762D5024}"/>
+          </ac:picMkLst>
+        </pc:picChg>
+      </pc:sldChg>
+      <pc:sldChg chg="modSp">
+        <pc:chgData name="william a" userId="c66c7249b60d4ab2" providerId="LiveId" clId="{21780EC7-48F1-479C-B262-47D82C4FC68B}" dt="2019-07-01T23:12:10.803" v="1008" actId="27636"/>
+        <pc:sldMkLst>
+          <pc:docMk/>
+          <pc:sldMk cId="3580237662" sldId="285"/>
+        </pc:sldMkLst>
+        <pc:spChg chg="mod">
+          <ac:chgData name="william a" userId="c66c7249b60d4ab2" providerId="LiveId" clId="{21780EC7-48F1-479C-B262-47D82C4FC68B}" dt="2019-07-01T23:12:10.803" v="1008" actId="27636"/>
+          <ac:spMkLst>
+            <pc:docMk/>
+            <pc:sldMk cId="3580237662" sldId="285"/>
+            <ac:spMk id="3" creationId="{65B32B1F-E0DF-456C-B7E0-F6CB2CBEA651}"/>
+          </ac:spMkLst>
+        </pc:spChg>
+      </pc:sldChg>
+      <pc:sldChg chg="modSp">
+        <pc:chgData name="william a" userId="c66c7249b60d4ab2" providerId="LiveId" clId="{21780EC7-48F1-479C-B262-47D82C4FC68B}" dt="2019-07-01T22:47:04.120" v="89" actId="113"/>
+        <pc:sldMkLst>
+          <pc:docMk/>
+          <pc:sldMk cId="2815070541" sldId="286"/>
+        </pc:sldMkLst>
+        <pc:spChg chg="mod">
+          <ac:chgData name="william a" userId="c66c7249b60d4ab2" providerId="LiveId" clId="{21780EC7-48F1-479C-B262-47D82C4FC68B}" dt="2019-07-01T22:47:04.120" v="89" actId="113"/>
+          <ac:spMkLst>
+            <pc:docMk/>
+            <pc:sldMk cId="2815070541" sldId="286"/>
+            <ac:spMk id="3" creationId="{65B32B1F-E0DF-456C-B7E0-F6CB2CBEA651}"/>
+          </ac:spMkLst>
+        </pc:spChg>
+      </pc:sldChg>
+      <pc:sldChg chg="modSp">
+        <pc:chgData name="william a" userId="c66c7249b60d4ab2" providerId="LiveId" clId="{21780EC7-48F1-479C-B262-47D82C4FC68B}" dt="2019-07-01T22:35:06.871" v="51" actId="20577"/>
+        <pc:sldMkLst>
+          <pc:docMk/>
+          <pc:sldMk cId="3735776281" sldId="287"/>
+        </pc:sldMkLst>
+        <pc:spChg chg="mod">
+          <ac:chgData name="william a" userId="c66c7249b60d4ab2" providerId="LiveId" clId="{21780EC7-48F1-479C-B262-47D82C4FC68B}" dt="2019-07-01T22:35:06.871" v="51" actId="20577"/>
+          <ac:spMkLst>
+            <pc:docMk/>
+            <pc:sldMk cId="3735776281" sldId="287"/>
+            <ac:spMk id="3" creationId="{65B32B1F-E0DF-456C-B7E0-F6CB2CBEA651}"/>
+          </ac:spMkLst>
+        </pc:spChg>
+      </pc:sldChg>
+      <pc:sldChg chg="modSp add">
+        <pc:chgData name="william a" userId="c66c7249b60d4ab2" providerId="LiveId" clId="{21780EC7-48F1-479C-B262-47D82C4FC68B}" dt="2019-07-01T23:06:17.543" v="599" actId="115"/>
+        <pc:sldMkLst>
+          <pc:docMk/>
+          <pc:sldMk cId="2001328530" sldId="289"/>
+        </pc:sldMkLst>
+        <pc:spChg chg="mod">
+          <ac:chgData name="william a" userId="c66c7249b60d4ab2" providerId="LiveId" clId="{21780EC7-48F1-479C-B262-47D82C4FC68B}" dt="2019-07-01T23:06:17.543" v="599" actId="115"/>
+          <ac:spMkLst>
+            <pc:docMk/>
+            <pc:sldMk cId="2001328530" sldId="289"/>
+            <ac:spMk id="3" creationId="{65B32B1F-E0DF-456C-B7E0-F6CB2CBEA651}"/>
+          </ac:spMkLst>
+        </pc:spChg>
+      </pc:sldChg>
+    </pc:docChg>
+  </pc:docChgLst>
 </pc:chgInfo>
 </file>
 
@@ -492,7 +861,7 @@
           <a:p>
             <a:fld id="{30D566E9-7533-4009-AB0E-92B8486EDC97}" type="datetimeFigureOut">
               <a:rPr lang="en-US" smtClean="0"/>
-              <a:t>6/27/2019</a:t>
+              <a:t>7/1/2019</a:t>
             </a:fld>
             <a:endParaRPr lang="en-US"/>
           </a:p>
@@ -690,7 +1059,7 @@
           <a:p>
             <a:fld id="{30D566E9-7533-4009-AB0E-92B8486EDC97}" type="datetimeFigureOut">
               <a:rPr lang="en-US" smtClean="0"/>
-              <a:t>6/27/2019</a:t>
+              <a:t>7/1/2019</a:t>
             </a:fld>
             <a:endParaRPr lang="en-US"/>
           </a:p>
@@ -898,7 +1267,7 @@
           <a:p>
             <a:fld id="{30D566E9-7533-4009-AB0E-92B8486EDC97}" type="datetimeFigureOut">
               <a:rPr lang="en-US" smtClean="0"/>
-              <a:t>6/27/2019</a:t>
+              <a:t>7/1/2019</a:t>
             </a:fld>
             <a:endParaRPr lang="en-US"/>
           </a:p>
@@ -1096,7 +1465,7 @@
           <a:p>
             <a:fld id="{30D566E9-7533-4009-AB0E-92B8486EDC97}" type="datetimeFigureOut">
               <a:rPr lang="en-US" smtClean="0"/>
-              <a:t>6/27/2019</a:t>
+              <a:t>7/1/2019</a:t>
             </a:fld>
             <a:endParaRPr lang="en-US"/>
           </a:p>
@@ -1371,7 +1740,7 @@
           <a:p>
             <a:fld id="{30D566E9-7533-4009-AB0E-92B8486EDC97}" type="datetimeFigureOut">
               <a:rPr lang="en-US" smtClean="0"/>
-              <a:t>6/27/2019</a:t>
+              <a:t>7/1/2019</a:t>
             </a:fld>
             <a:endParaRPr lang="en-US"/>
           </a:p>
@@ -1636,7 +2005,7 @@
           <a:p>
             <a:fld id="{30D566E9-7533-4009-AB0E-92B8486EDC97}" type="datetimeFigureOut">
               <a:rPr lang="en-US" smtClean="0"/>
-              <a:t>6/27/2019</a:t>
+              <a:t>7/1/2019</a:t>
             </a:fld>
             <a:endParaRPr lang="en-US"/>
           </a:p>
@@ -2048,7 +2417,7 @@
           <a:p>
             <a:fld id="{30D566E9-7533-4009-AB0E-92B8486EDC97}" type="datetimeFigureOut">
               <a:rPr lang="en-US" smtClean="0"/>
-              <a:t>6/27/2019</a:t>
+              <a:t>7/1/2019</a:t>
             </a:fld>
             <a:endParaRPr lang="en-US"/>
           </a:p>
@@ -2189,7 +2558,7 @@
           <a:p>
             <a:fld id="{30D566E9-7533-4009-AB0E-92B8486EDC97}" type="datetimeFigureOut">
               <a:rPr lang="en-US" smtClean="0"/>
-              <a:t>6/27/2019</a:t>
+              <a:t>7/1/2019</a:t>
             </a:fld>
             <a:endParaRPr lang="en-US"/>
           </a:p>
@@ -2302,7 +2671,7 @@
           <a:p>
             <a:fld id="{30D566E9-7533-4009-AB0E-92B8486EDC97}" type="datetimeFigureOut">
               <a:rPr lang="en-US" smtClean="0"/>
-              <a:t>6/27/2019</a:t>
+              <a:t>7/1/2019</a:t>
             </a:fld>
             <a:endParaRPr lang="en-US"/>
           </a:p>
@@ -2613,7 +2982,7 @@
           <a:p>
             <a:fld id="{30D566E9-7533-4009-AB0E-92B8486EDC97}" type="datetimeFigureOut">
               <a:rPr lang="en-US" smtClean="0"/>
-              <a:t>6/27/2019</a:t>
+              <a:t>7/1/2019</a:t>
             </a:fld>
             <a:endParaRPr lang="en-US"/>
           </a:p>
@@ -2901,7 +3270,7 @@
           <a:p>
             <a:fld id="{30D566E9-7533-4009-AB0E-92B8486EDC97}" type="datetimeFigureOut">
               <a:rPr lang="en-US" smtClean="0"/>
-              <a:t>6/27/2019</a:t>
+              <a:t>7/1/2019</a:t>
             </a:fld>
             <a:endParaRPr lang="en-US"/>
           </a:p>
@@ -3142,7 +3511,7 @@
           <a:p>
             <a:fld id="{30D566E9-7533-4009-AB0E-92B8486EDC97}" type="datetimeFigureOut">
               <a:rPr lang="en-US" smtClean="0"/>
-              <a:t>6/27/2019</a:t>
+              <a:t>7/1/2019</a:t>
             </a:fld>
             <a:endParaRPr lang="en-US"/>
           </a:p>
@@ -3673,7 +4042,7 @@
         <p:spPr/>
         <p:txBody>
           <a:bodyPr>
-            <a:normAutofit lnSpcReduction="10000"/>
+            <a:normAutofit/>
           </a:bodyPr>
           <a:lstStyle/>
           <a:p>
@@ -3708,13 +4077,6 @@
             <a:r>
               <a:rPr lang="en-US" sz="3600" dirty="0"/>
               <a:t>Can warn you if you’re re-using the same password</a:t>
-            </a:r>
-          </a:p>
-          <a:p>
-            <a:pPr lvl="1"/>
-            <a:r>
-              <a:rPr lang="en-US" sz="3600" dirty="0"/>
-              <a:t>Easily share a password with family/friends</a:t>
             </a:r>
           </a:p>
           <a:p>
@@ -3813,14 +4175,36 @@
           <a:p>
             <a:r>
               <a:rPr lang="en-US" sz="4000" dirty="0"/>
-              <a:t>Passwords alone are a terrible security method</a:t>
-            </a:r>
+              <a:t>Passwords </a:t>
+            </a:r>
+            <a:r>
+              <a:rPr lang="en-US" sz="4000" i="1" dirty="0"/>
+              <a:t>alone</a:t>
+            </a:r>
+            <a:r>
+              <a:rPr lang="en-US" sz="4000" dirty="0"/>
+              <a:t> are a terrible security method</a:t>
+            </a:r>
+          </a:p>
+          <a:p>
             <a:endParaRPr lang="en-US" sz="3600" dirty="0"/>
           </a:p>
           <a:p>
             <a:r>
-              <a:rPr lang="en-US" sz="4400" dirty="0"/>
-              <a:t>TFA or MFA (Two-factor or Multi-factor) authentication is something aside from a password that allows a website to confirm you are you.</a:t>
+              <a:rPr lang="en-US" sz="5400" dirty="0"/>
+              <a:t>TFA or MFA (Two-factor or Multi-factor) authentication is </a:t>
+            </a:r>
+            <a:r>
+              <a:rPr lang="en-US" sz="5400" b="1" dirty="0"/>
+              <a:t>something</a:t>
+            </a:r>
+            <a:r>
+              <a:rPr lang="en-US" sz="5400" dirty="0"/>
+              <a:t> aside from a password that allows a website to </a:t>
+            </a:r>
+            <a:r>
+              <a:rPr lang="en-US" sz="5400" b="1" dirty="0"/>
+              <a:t>confirm you are you.</a:t>
             </a:r>
           </a:p>
         </p:txBody>
@@ -3907,12 +4291,12 @@
         </p:spPr>
         <p:txBody>
           <a:bodyPr>
-            <a:normAutofit lnSpcReduction="10000"/>
+            <a:normAutofit/>
           </a:bodyPr>
           <a:lstStyle/>
           <a:p>
             <a:r>
-              <a:rPr lang="en-US" sz="3200" dirty="0"/>
+              <a:rPr lang="en-US" sz="3200" b="1" dirty="0"/>
               <a:t>Use TFA for EVERY ACCOUNT on EVERY WEBSITE YOU CAN:</a:t>
             </a:r>
           </a:p>
@@ -3927,7 +4311,7 @@
             <a:pPr lvl="1"/>
             <a:r>
               <a:rPr lang="en-US" sz="2800" dirty="0"/>
-              <a:t>Banking/Financial</a:t>
+              <a:t>Banking/Financial/Bill Payment</a:t>
             </a:r>
           </a:p>
           <a:p>
@@ -3970,14 +4354,7 @@
             <a:pPr lvl="1"/>
             <a:r>
               <a:rPr lang="en-US" sz="2800" dirty="0"/>
-              <a:t>Social media</a:t>
-            </a:r>
-          </a:p>
-          <a:p>
-            <a:pPr lvl="1"/>
-            <a:r>
-              <a:rPr lang="en-US" sz="2800" dirty="0"/>
-              <a:t>E-commerce</a:t>
+              <a:t>Social media, e-commerce, Gaming and Streaming services</a:t>
             </a:r>
           </a:p>
           <a:p>
@@ -3985,13 +4362,6 @@
             <a:r>
               <a:rPr lang="en-US" sz="2800" dirty="0"/>
               <a:t>Government, public service, utility providers</a:t>
-            </a:r>
-          </a:p>
-          <a:p>
-            <a:pPr lvl="1"/>
-            <a:r>
-              <a:rPr lang="en-US" sz="2800" dirty="0"/>
-              <a:t>Gaming and Streaming services</a:t>
             </a:r>
           </a:p>
           <a:p>
@@ -4005,7 +4375,10 @@
               </a:rPr>
               <a:t>twofactorauth.org</a:t>
             </a:r>
-            <a:endParaRPr lang="en-US" sz="3200" dirty="0"/>
+            <a:r>
+              <a:rPr lang="en-US" sz="3200" dirty="0"/>
+              <a:t> or just got to the security settings/menu and see. Most do.</a:t>
+            </a:r>
           </a:p>
         </p:txBody>
       </p:sp>
@@ -4091,7 +4464,7 @@
         </p:spPr>
         <p:txBody>
           <a:bodyPr>
-            <a:normAutofit/>
+            <a:normAutofit fontScale="92500" lnSpcReduction="20000"/>
           </a:bodyPr>
           <a:lstStyle/>
           <a:p>
@@ -4099,15 +4472,16 @@
               <a:buNone/>
             </a:pPr>
             <a:r>
-              <a:rPr lang="en-US" sz="3200" dirty="0"/>
-              <a:t>TFA is hardly a new concept, </a:t>
-            </a:r>
-            <a:br>
-              <a:rPr lang="en-US" sz="3200" dirty="0"/>
-            </a:br>
-            <a:r>
-              <a:rPr lang="en-US" sz="3200" dirty="0"/>
-              <a:t>but the implementation is still developing.</a:t>
+              <a:rPr lang="en-US" sz="4300" dirty="0"/>
+              <a:t>TFA is hardly a new concept, but the implementation is still developing and the industry is always</a:t>
+            </a:r>
+            <a:r>
+              <a:rPr lang="en-US" sz="4300" b="1" dirty="0"/>
+              <a:t> trying to overcome consumer’s desire to be really dumb and stubborn</a:t>
+            </a:r>
+            <a:r>
+              <a:rPr lang="en-US" sz="4300" dirty="0"/>
+              <a:t>.</a:t>
             </a:r>
           </a:p>
           <a:p>
@@ -4361,10 +4735,10 @@
       </p:sp>
       <p:pic>
         <p:nvPicPr>
-          <p:cNvPr id="4" name="Picture 3">
-            <a:extLst>
-              <a:ext uri="{FF2B5EF4-FFF2-40B4-BE49-F238E27FC236}">
-                <a16:creationId xmlns:a16="http://schemas.microsoft.com/office/drawing/2014/main" id="{C8B538B1-3147-4D95-AADF-0D0E7E2B6519}"/>
+          <p:cNvPr id="6" name="Picture 5">
+            <a:extLst>
+              <a:ext uri="{FF2B5EF4-FFF2-40B4-BE49-F238E27FC236}">
+                <a16:creationId xmlns:a16="http://schemas.microsoft.com/office/drawing/2014/main" id="{A1E34164-E89A-417F-9FA3-9AC0F86AFD3C}"/>
               </a:ext>
             </a:extLst>
           </p:cNvPr>
@@ -4373,15 +4747,16 @@
           </p:cNvPicPr>
           <p:nvPr/>
         </p:nvPicPr>
-        <p:blipFill rotWithShape="1">
+        <p:blipFill>
           <a:blip r:embed="rId2"/>
-          <a:srcRect t="46522"/>
-          <a:stretch/>
+          <a:stretch>
+            <a:fillRect/>
+          </a:stretch>
         </p:blipFill>
         <p:spPr>
           <a:xfrm>
-            <a:off x="7905747" y="2134810"/>
-            <a:ext cx="3757613" cy="962405"/>
+            <a:off x="7753350" y="4565447"/>
+            <a:ext cx="3815865" cy="556480"/>
           </a:xfrm>
           <a:prstGeom prst="rect">
             <a:avLst/>
@@ -4390,10 +4765,10 @@
       </p:pic>
       <p:pic>
         <p:nvPicPr>
-          <p:cNvPr id="6" name="Picture 5">
-            <a:extLst>
-              <a:ext uri="{FF2B5EF4-FFF2-40B4-BE49-F238E27FC236}">
-                <a16:creationId xmlns:a16="http://schemas.microsoft.com/office/drawing/2014/main" id="{A1E34164-E89A-417F-9FA3-9AC0F86AFD3C}"/>
+          <p:cNvPr id="5" name="Picture 4">
+            <a:extLst>
+              <a:ext uri="{FF2B5EF4-FFF2-40B4-BE49-F238E27FC236}">
+                <a16:creationId xmlns:a16="http://schemas.microsoft.com/office/drawing/2014/main" id="{BBA9C656-6F70-4925-8B8A-69B65FA112C7}"/>
               </a:ext>
             </a:extLst>
           </p:cNvPr>
@@ -4410,8 +4785,8 @@
         </p:blipFill>
         <p:spPr>
           <a:xfrm>
-            <a:off x="7876622" y="3760785"/>
-            <a:ext cx="3815865" cy="556480"/>
+            <a:off x="7753350" y="1524000"/>
+            <a:ext cx="3991532" cy="2591162"/>
           </a:xfrm>
           <a:prstGeom prst="rect">
             <a:avLst/>
@@ -4616,6 +4991,46 @@
           </a:prstGeom>
         </p:spPr>
       </p:pic>
+      <p:sp>
+        <p:nvSpPr>
+          <p:cNvPr id="5" name="TextBox 4">
+            <a:extLst>
+              <a:ext uri="{FF2B5EF4-FFF2-40B4-BE49-F238E27FC236}">
+                <a16:creationId xmlns:a16="http://schemas.microsoft.com/office/drawing/2014/main" id="{FA2E4623-825E-45DB-AF79-765BC674D041}"/>
+              </a:ext>
+            </a:extLst>
+          </p:cNvPr>
+          <p:cNvSpPr txBox="1"/>
+          <p:nvPr/>
+        </p:nvSpPr>
+        <p:spPr>
+          <a:xfrm>
+            <a:off x="7815532" y="3959525"/>
+            <a:ext cx="3795623" cy="369332"/>
+          </a:xfrm>
+          <a:prstGeom prst="rect">
+            <a:avLst/>
+          </a:prstGeom>
+          <a:noFill/>
+        </p:spPr>
+        <p:txBody>
+          <a:bodyPr wrap="square" rtlCol="0">
+            <a:spAutoFit/>
+          </a:bodyPr>
+          <a:lstStyle/>
+          <a:p>
+            <a:pPr algn="r"/>
+            <a:r>
+              <a:rPr lang="en-US" dirty="0">
+                <a:solidFill>
+                  <a:srgbClr val="FF0000"/>
+                </a:solidFill>
+              </a:rPr>
+              <a:t>This is an actual scam!</a:t>
+            </a:r>
+          </a:p>
+        </p:txBody>
+      </p:sp>
     </p:spTree>
     <p:extLst>
       <p:ext uri="{BB962C8B-B14F-4D97-AF65-F5344CB8AC3E}">
@@ -4693,7 +5108,7 @@
         <p:spPr/>
         <p:txBody>
           <a:bodyPr>
-            <a:normAutofit lnSpcReduction="10000"/>
+            <a:normAutofit fontScale="92500"/>
           </a:bodyPr>
           <a:lstStyle/>
           <a:p>
@@ -4713,6 +5128,9 @@
               <a:rPr lang="en-US" sz="3600" dirty="0"/>
               <a:t>SMS-based authentication is much better than no TFA</a:t>
             </a:r>
+          </a:p>
+          <a:p>
+            <a:endParaRPr lang="en-US" sz="3600" dirty="0"/>
           </a:p>
           <a:p>
             <a:r>
@@ -4798,8 +5216,8 @@
         </p:nvSpPr>
         <p:spPr>
           <a:xfrm>
-            <a:off x="838200" y="1825625"/>
-            <a:ext cx="4962525" cy="4351338"/>
+            <a:off x="838200" y="1498204"/>
+            <a:ext cx="4962525" cy="5195893"/>
           </a:xfrm>
         </p:spPr>
         <p:txBody>
@@ -4816,7 +5234,13 @@
           <a:p>
             <a:r>
               <a:rPr lang="en-US" sz="3600" dirty="0"/>
-              <a:t>Given an initial secret set up in your phone,  your phone can generate a code that changes at intervals.</a:t>
+              <a:t>Given an initial secret,  your phone can generate a code that changes at intervals.</a:t>
+            </a:r>
+          </a:p>
+          <a:p>
+            <a:r>
+              <a:rPr lang="en-US" sz="3600" dirty="0"/>
+              <a:t>The website uses the shared key to generate the same code.</a:t>
             </a:r>
           </a:p>
         </p:txBody>
@@ -5056,7 +5480,7 @@
           </a:p>
           <a:p>
             <a:r>
-              <a:rPr lang="en-US" sz="4000" b="1" dirty="0"/>
+              <a:rPr lang="en-US" sz="4000" dirty="0"/>
               <a:t>LastPass Authenticator</a:t>
             </a:r>
           </a:p>
@@ -5369,28 +5793,32 @@
             </a:r>
             <a:r>
               <a:rPr lang="en-US" sz="3600" b="1" dirty="0"/>
-              <a:t>generates a number which you type in </a:t>
+              <a:t>generates a number which you type in to the website</a:t>
             </a:r>
             <a:r>
               <a:rPr lang="en-US" sz="3600" dirty="0"/>
-              <a:t>within that time interval, or, </a:t>
+              <a:t>, </a:t>
             </a:r>
             <a:br>
               <a:rPr lang="en-US" sz="3600" dirty="0"/>
             </a:br>
             <a:r>
+              <a:rPr lang="en-US" sz="3600" dirty="0"/>
+              <a:t>or approve via a push notification.</a:t>
+            </a:r>
+          </a:p>
+          <a:p>
+            <a:r>
+              <a:rPr lang="en-US" sz="3600" dirty="0"/>
+              <a:t>This is </a:t>
+            </a:r>
+            <a:r>
               <a:rPr lang="en-US" sz="3600" b="1" dirty="0"/>
-              <a:t>you approve via a push-notification</a:t>
+              <a:t>far more secure than text-message (SMS) </a:t>
             </a:r>
             <a:r>
               <a:rPr lang="en-US" sz="3600" dirty="0"/>
-              <a:t>.</a:t>
-            </a:r>
-          </a:p>
-          <a:p>
-            <a:r>
-              <a:rPr lang="en-US" sz="3600" dirty="0"/>
-              <a:t>This is far more secure than text-message (SMS) based authentication.</a:t>
+              <a:t>based authentication.</a:t>
             </a:r>
           </a:p>
           <a:p>
@@ -5679,7 +6107,7 @@
         </p:spPr>
         <p:txBody>
           <a:bodyPr>
-            <a:normAutofit fontScale="92500"/>
+            <a:normAutofit fontScale="92500" lnSpcReduction="10000"/>
           </a:bodyPr>
           <a:lstStyle/>
           <a:p>
@@ -5691,7 +6119,7 @@
           <a:p>
             <a:r>
               <a:rPr lang="en-US" sz="3600" dirty="0"/>
-              <a:t>Or, a hardware key that integrates with software to provide a TFA presence only when plugged into a USB port on the accessing device.</a:t>
+              <a:t>Or, a hardware key that integrates with software to provide a TFA presence only when plugged into a USB port on the accessing device, when a button is pressed.</a:t>
             </a:r>
           </a:p>
         </p:txBody>
@@ -5790,36 +6218,6 @@
       </p:pic>
       <p:pic>
         <p:nvPicPr>
-          <p:cNvPr id="4" name="Picture 3">
-            <a:extLst>
-              <a:ext uri="{FF2B5EF4-FFF2-40B4-BE49-F238E27FC236}">
-                <a16:creationId xmlns:a16="http://schemas.microsoft.com/office/drawing/2014/main" id="{527CAA44-A937-40D3-B043-FCEC4D0BAC55}"/>
-              </a:ext>
-            </a:extLst>
-          </p:cNvPr>
-          <p:cNvPicPr>
-            <a:picLocks noChangeAspect="1"/>
-          </p:cNvPicPr>
-          <p:nvPr/>
-        </p:nvPicPr>
-        <p:blipFill>
-          <a:blip r:embed="rId3"/>
-          <a:stretch>
-            <a:fillRect/>
-          </a:stretch>
-        </p:blipFill>
-        <p:spPr>
-          <a:xfrm>
-            <a:off x="7877174" y="3741012"/>
-            <a:ext cx="4210051" cy="2950299"/>
-          </a:xfrm>
-          <a:prstGeom prst="rect">
-            <a:avLst/>
-          </a:prstGeom>
-        </p:spPr>
-      </p:pic>
-      <p:pic>
-        <p:nvPicPr>
           <p:cNvPr id="2052" name="Picture 4" descr="Image result for yubikey">
             <a:extLst>
               <a:ext uri="{FF2B5EF4-FFF2-40B4-BE49-F238E27FC236}">
@@ -5833,7 +6231,7 @@
           <p:nvPr/>
         </p:nvPicPr>
         <p:blipFill>
-          <a:blip r:embed="rId4">
+          <a:blip r:embed="rId3">
             <a:extLst>
               <a:ext uri="{28A0092B-C50C-407E-A947-70E740481C1C}">
                 <a14:useLocalDpi xmlns:a14="http://schemas.microsoft.com/office/drawing/2010/main" val="0"/>
@@ -5847,7 +6245,7 @@
         </p:blipFill>
         <p:spPr bwMode="auto">
           <a:xfrm>
-            <a:off x="7877174" y="3830999"/>
+            <a:off x="7877174" y="4001294"/>
             <a:ext cx="4072968" cy="2712676"/>
           </a:xfrm>
           <a:prstGeom prst="rect">
@@ -5989,20 +6387,6 @@
           <a:p>
             <a:r>
               <a:rPr lang="en-US" sz="3600" dirty="0"/>
-              <a:t>Pictured: </a:t>
-            </a:r>
-            <a:r>
-              <a:rPr lang="en-US" sz="3600" dirty="0" err="1"/>
-              <a:t>Yubikey</a:t>
-            </a:r>
-            <a:r>
-              <a:rPr lang="en-US" sz="3600" dirty="0"/>
-              <a:t> ($25 on Amazon)</a:t>
-            </a:r>
-          </a:p>
-          <a:p>
-            <a:r>
-              <a:rPr lang="en-US" sz="3600" dirty="0"/>
               <a:t>You can (and should!) create duplicate </a:t>
             </a:r>
             <a:br>
@@ -6019,6 +6403,26 @@
               <a:rPr lang="en-US" sz="3600" dirty="0"/>
               <a:t>in a safe at home, for example.</a:t>
             </a:r>
+          </a:p>
+          <a:p>
+            <a:pPr marL="0" indent="0">
+              <a:buNone/>
+            </a:pPr>
+            <a:r>
+              <a:rPr lang="en-US" sz="2400" dirty="0"/>
+              <a:t>Pictured: </a:t>
+            </a:r>
+            <a:r>
+              <a:rPr lang="en-US" sz="2400" dirty="0" err="1"/>
+              <a:t>Yubikey</a:t>
+            </a:r>
+            <a:r>
+              <a:rPr lang="en-US" sz="2400" dirty="0"/>
+              <a:t> ($25 on Amazon)</a:t>
+            </a:r>
+          </a:p>
+          <a:p>
+            <a:endParaRPr lang="en-US" sz="3600" dirty="0"/>
           </a:p>
         </p:txBody>
       </p:sp>
@@ -6144,12 +6548,12 @@
         <p:spPr>
           <a:xfrm>
             <a:off x="838199" y="1825625"/>
-            <a:ext cx="10772775" cy="4351338"/>
+            <a:ext cx="11258276" cy="4351338"/>
           </a:xfrm>
         </p:spPr>
         <p:txBody>
           <a:bodyPr>
-            <a:normAutofit fontScale="77500" lnSpcReduction="20000"/>
+            <a:normAutofit fontScale="70000" lnSpcReduction="20000"/>
           </a:bodyPr>
           <a:lstStyle/>
           <a:p>
@@ -6161,13 +6565,41 @@
           <a:p>
             <a:r>
               <a:rPr lang="en-US" sz="5400" dirty="0"/>
-              <a:t>Some hardware-based keys support Bluetooth or NFC, or, carry a USB-C to USB adapter</a:t>
-            </a:r>
-          </a:p>
-          <a:p>
-            <a:r>
+              <a:t>Some hardware-based keys support </a:t>
+            </a:r>
+            <a:br>
               <a:rPr lang="en-US" sz="5400" dirty="0"/>
-              <a:t>Google’s Titan is the only option right now with Bluetooth, NFC based on latest FIDO standard </a:t>
+            </a:br>
+            <a:r>
+              <a:rPr lang="en-US" sz="5400" dirty="0"/>
+              <a:t>Bluetooth or NFC, or, carry a USB-C</a:t>
+            </a:r>
+            <a:br>
+              <a:rPr lang="en-US" sz="5400" dirty="0"/>
+            </a:br>
+            <a:r>
+              <a:rPr lang="en-US" sz="5400" dirty="0"/>
+              <a:t>to USB adapter</a:t>
+            </a:r>
+          </a:p>
+          <a:p>
+            <a:r>
+              <a:rPr lang="en-US" sz="5400" dirty="0"/>
+              <a:t>Google’s Titan (right) is the only option </a:t>
+            </a:r>
+            <a:br>
+              <a:rPr lang="en-US" sz="5400" dirty="0"/>
+            </a:br>
+            <a:r>
+              <a:rPr lang="en-US" sz="5400" dirty="0"/>
+              <a:t>right now with Bluetooth and NFC</a:t>
+            </a:r>
+            <a:br>
+              <a:rPr lang="en-US" sz="5400" dirty="0"/>
+            </a:br>
+            <a:r>
+              <a:rPr lang="en-US" sz="5400" dirty="0"/>
+              <a:t>on the latest FIDO standard </a:t>
             </a:r>
           </a:p>
           <a:p>
@@ -6223,6 +6655,36 @@
           </a:p>
         </p:txBody>
       </p:sp>
+      <p:pic>
+        <p:nvPicPr>
+          <p:cNvPr id="4" name="Picture 3">
+            <a:extLst>
+              <a:ext uri="{FF2B5EF4-FFF2-40B4-BE49-F238E27FC236}">
+                <a16:creationId xmlns:a16="http://schemas.microsoft.com/office/drawing/2014/main" id="{BFB227FF-08F1-47EB-81AF-177D762D5024}"/>
+              </a:ext>
+            </a:extLst>
+          </p:cNvPr>
+          <p:cNvPicPr>
+            <a:picLocks noChangeAspect="1"/>
+          </p:cNvPicPr>
+          <p:nvPr/>
+        </p:nvPicPr>
+        <p:blipFill>
+          <a:blip r:embed="rId2"/>
+          <a:stretch>
+            <a:fillRect/>
+          </a:stretch>
+        </p:blipFill>
+        <p:spPr>
+          <a:xfrm>
+            <a:off x="8886102" y="2409248"/>
+            <a:ext cx="3210373" cy="3581900"/>
+          </a:xfrm>
+          <a:prstGeom prst="rect">
+            <a:avLst/>
+          </a:prstGeom>
+        </p:spPr>
+      </p:pic>
     </p:spTree>
     <p:extLst>
       <p:ext uri="{BB962C8B-B14F-4D97-AF65-F5344CB8AC3E}">
@@ -6353,12 +6815,12 @@
               <a:t>on their work-related accounts since early 2017, when it began requiring all employees to use physical Security Keys in place of passwords and one-time codes.” </a:t>
             </a:r>
             <a:r>
-              <a:rPr lang="en-US" sz="1900" dirty="0">
+              <a:rPr lang="en-US" sz="1400" dirty="0">
                 <a:hlinkClick r:id="rId3"/>
               </a:rPr>
               <a:t>https://krebsonsecurity.com/2018/07/google-security-keys-neutralized-employee-phishing/</a:t>
             </a:r>
-            <a:endParaRPr lang="en-US" sz="1900" dirty="0"/>
+            <a:endParaRPr lang="en-US" sz="1400" dirty="0"/>
           </a:p>
           <a:p>
             <a:endParaRPr lang="en-US" sz="3600" dirty="0"/>
@@ -6492,60 +6954,57 @@
         </p:spPr>
         <p:txBody>
           <a:bodyPr>
-            <a:normAutofit/>
+            <a:normAutofit lnSpcReduction="10000"/>
           </a:bodyPr>
           <a:lstStyle/>
           <a:p>
-            <a:r>
-              <a:rPr lang="en-US" b="1" dirty="0"/>
+            <a:pPr marL="0" indent="0">
+              <a:buNone/>
+            </a:pPr>
+            <a:r>
+              <a:rPr lang="en-US" sz="3200" b="1" dirty="0"/>
               <a:t>Do I need to keep a Security Key with me at all times?</a:t>
             </a:r>
           </a:p>
           <a:p>
             <a:r>
-              <a:rPr lang="en-US" dirty="0"/>
+              <a:rPr lang="en-US" sz="3200" dirty="0"/>
               <a:t>We recommend you </a:t>
             </a:r>
             <a:r>
-              <a:rPr lang="en-US" b="1" dirty="0"/>
+              <a:rPr lang="en-US" sz="3200" b="1" dirty="0"/>
               <a:t>always keep a Security Key close</a:t>
             </a:r>
             <a:r>
-              <a:rPr lang="en-US" dirty="0"/>
+              <a:rPr lang="en-US" sz="3200" dirty="0"/>
               <a:t> in case you log out of your account or need to sign in on a new device. In all likelihood, this will happen infrequently. Remember to take one with you when traveling.</a:t>
             </a:r>
           </a:p>
           <a:p>
-            <a:r>
-              <a:rPr lang="en-US" b="1" dirty="0"/>
+            <a:pPr marL="0" indent="0">
+              <a:buNone/>
+            </a:pPr>
+            <a:r>
+              <a:rPr lang="en-US" sz="3200" b="1" dirty="0"/>
               <a:t>What happens if I lose both of my Security Keys?</a:t>
             </a:r>
           </a:p>
           <a:p>
             <a:r>
-              <a:rPr lang="en-US" dirty="0"/>
+              <a:rPr lang="en-US" sz="3200" dirty="0"/>
               <a:t>If you still have access to a logged-in session, you can visit </a:t>
             </a:r>
             <a:r>
-              <a:rPr lang="en-US" dirty="0">
+              <a:rPr lang="en-US" sz="3200" dirty="0">
                 <a:hlinkClick r:id="rId2"/>
               </a:rPr>
               <a:t>account.google.com</a:t>
             </a:r>
             <a:r>
-              <a:rPr lang="en-US" dirty="0"/>
+              <a:rPr lang="en-US" sz="3200" dirty="0"/>
               <a:t> and register replacement keys in place of the lost keys. If you have lost both keys and do not have access to a logged-in session, you will need to submit a request to recover your account. It will take a few days for Google to verify it’s you and grant you access to your account.</a:t>
             </a:r>
-            <a:br>
-              <a:rPr lang="en-US" dirty="0"/>
-            </a:br>
-            <a:r>
-              <a:rPr lang="en-US" sz="1800" dirty="0">
-                <a:hlinkClick r:id="rId3"/>
-              </a:rPr>
-              <a:t>https://landing.google.com/advancedprotection/</a:t>
-            </a:r>
-            <a:endParaRPr lang="en-US" sz="1800" dirty="0"/>
+            <a:endParaRPr lang="en-US" sz="2000" dirty="0"/>
           </a:p>
         </p:txBody>
       </p:sp>
@@ -6778,9 +7237,16 @@
             <p:ph type="title"/>
           </p:nvPr>
         </p:nvSpPr>
-        <p:spPr/>
-        <p:txBody>
-          <a:bodyPr/>
+        <p:spPr>
+          <a:xfrm>
+            <a:off x="838200" y="365126"/>
+            <a:ext cx="10515600" cy="618286"/>
+          </a:xfrm>
+        </p:spPr>
+        <p:txBody>
+          <a:bodyPr>
+            <a:normAutofit fontScale="90000"/>
+          </a:bodyPr>
           <a:lstStyle/>
           <a:p>
             <a:r>
@@ -6806,199 +7272,222 @@
             <p:ph idx="1"/>
           </p:nvPr>
         </p:nvSpPr>
-        <p:spPr/>
+        <p:spPr>
+          <a:xfrm>
+            <a:off x="414067" y="854014"/>
+            <a:ext cx="11205713" cy="5788325"/>
+          </a:xfrm>
+        </p:spPr>
         <p:txBody>
           <a:bodyPr>
-            <a:normAutofit fontScale="55000" lnSpcReduction="20000"/>
+            <a:normAutofit lnSpcReduction="10000"/>
           </a:bodyPr>
           <a:lstStyle/>
           <a:p>
             <a:r>
-              <a:rPr lang="en-US" b="1" dirty="0"/>
+              <a:rPr lang="en-US" sz="1600" b="1" dirty="0"/>
               <a:t>How Russian </a:t>
             </a:r>
             <a:r>
-              <a:rPr lang="en-US" b="1" dirty="0" err="1"/>
+              <a:rPr lang="en-US" sz="1600" b="1" dirty="0" err="1"/>
               <a:t>Cyberpower</a:t>
             </a:r>
             <a:r>
-              <a:rPr lang="en-US" b="1" dirty="0"/>
+              <a:rPr lang="en-US" sz="1600" b="1" dirty="0"/>
               <a:t> Invaded the U.S.</a:t>
             </a:r>
             <a:r>
-              <a:rPr lang="en-US" b="1" i="1" dirty="0"/>
+              <a:rPr lang="en-US" sz="1600" b="1" i="1" dirty="0"/>
               <a:t> </a:t>
             </a:r>
             <a:r>
-              <a:rPr lang="en-US" dirty="0">
+              <a:rPr lang="en-US" sz="1600" dirty="0">
                 <a:hlinkClick r:id="rId2"/>
               </a:rPr>
               <a:t>https://www.nytimes.com/2016/12/13/us/politics/russia-hack-election-dnc.html</a:t>
             </a:r>
-            <a:endParaRPr lang="en-US" dirty="0"/>
-          </a:p>
-          <a:p>
-            <a:r>
-              <a:rPr lang="en-US" b="1" dirty="0"/>
-              <a:t>Reddit Breach Highlights Limits of SMS-Based Authentication</a:t>
-            </a:r>
-            <a:br>
-              <a:rPr lang="en-US" b="1" dirty="0"/>
-            </a:br>
-            <a:r>
-              <a:rPr lang="en-US" dirty="0">
+            <a:endParaRPr lang="en-US" sz="1600" dirty="0"/>
+          </a:p>
+          <a:p>
+            <a:r>
+              <a:rPr lang="en-US" sz="1600" b="1" dirty="0"/>
+              <a:t>How to protect yourself from 'spear phishing' hacking technique </a:t>
+            </a:r>
+            <a:r>
+              <a:rPr lang="en-US" sz="1600" dirty="0">
                 <a:hlinkClick r:id="rId3"/>
               </a:rPr>
-              <a:t>https://krebsonsecurity.com/2018/08/reddit-breach-highlights-limits-of-sms-based-authentication/</a:t>
-            </a:r>
-            <a:endParaRPr lang="en-US" dirty="0"/>
-          </a:p>
-          <a:p>
-            <a:r>
-              <a:rPr lang="en-US" b="1" dirty="0"/>
-              <a:t>This is why you shouldn’t use texts for two-factor authentication</a:t>
-            </a:r>
-            <a:br>
-              <a:rPr lang="en-US" b="1" dirty="0"/>
-            </a:br>
-            <a:r>
-              <a:rPr lang="en-US" dirty="0">
+              <a:t>https://phys.org/news/2018-07-spear-phishing-hacking-technique.html</a:t>
+            </a:r>
+            <a:endParaRPr lang="en-US" sz="1600" dirty="0"/>
+          </a:p>
+          <a:p>
+            <a:r>
+              <a:rPr lang="en-US" sz="1600" b="1" dirty="0"/>
+              <a:t>Reddit Breach Highlights Limits of SMS-Based Authentication </a:t>
+            </a:r>
+            <a:r>
+              <a:rPr lang="en-US" sz="1600" dirty="0">
                 <a:hlinkClick r:id="rId4"/>
               </a:rPr>
-              <a:t>https://www.theverge.com/2017/9/18/16328172/sms-two-factor-authentication-hack-password-bitcoin</a:t>
-            </a:r>
-            <a:endParaRPr lang="en-US" dirty="0"/>
-          </a:p>
-          <a:p>
-            <a:r>
-              <a:rPr lang="en-US" b="1" dirty="0"/>
-              <a:t>Two-Factor Authentication: Who Has It and How to Set It Up</a:t>
-            </a:r>
-            <a:br>
-              <a:rPr lang="en-US" b="1" dirty="0"/>
-            </a:br>
-            <a:r>
-              <a:rPr lang="en-US" dirty="0">
+              <a:t>https://krebsonsecurity.com/2018/08/reddit-breach-highlights-limits-of-sms-based-authentication/</a:t>
+            </a:r>
+            <a:endParaRPr lang="en-US" sz="1600" dirty="0"/>
+          </a:p>
+          <a:p>
+            <a:r>
+              <a:rPr lang="en-US" sz="1600" b="1" dirty="0"/>
+              <a:t>This is why you shouldn’t use texts for two-factor authentication </a:t>
+            </a:r>
+            <a:r>
+              <a:rPr lang="en-US" sz="1600" dirty="0">
                 <a:hlinkClick r:id="rId5"/>
               </a:rPr>
-              <a:t>https://www.pcmag.com/feature/358289/two-factor-authentication-who-has-it-and-how-to-set-it-up</a:t>
-            </a:r>
-            <a:endParaRPr lang="en-US" dirty="0"/>
-          </a:p>
-          <a:p>
-            <a:r>
-              <a:rPr lang="en-US" b="1" dirty="0"/>
-              <a:t>Hackers beat 2-factor protection with automated phishing attacks</a:t>
-            </a:r>
-            <a:br>
-              <a:rPr lang="en-US" b="1" dirty="0"/>
-            </a:br>
-            <a:r>
-              <a:rPr lang="en-US" dirty="0">
+              <a:t>https://www.theverge.com/2017/9/18/16328172/sms-two-factor-authentication-hack-password-bitcoin</a:t>
+            </a:r>
+            <a:endParaRPr lang="en-US" sz="1600" dirty="0"/>
+          </a:p>
+          <a:p>
+            <a:r>
+              <a:rPr lang="en-US" sz="1600" b="1" dirty="0"/>
+              <a:t>Two-Factor Authentication: Who Has It and How to Set It Up </a:t>
+            </a:r>
+            <a:r>
+              <a:rPr lang="en-US" sz="1600" dirty="0">
                 <a:hlinkClick r:id="rId6"/>
               </a:rPr>
-              <a:t>https://mashable.com/article/hackers-beat-two-factor-authentication-2fa-phishing</a:t>
-            </a:r>
-            <a:r>
-              <a:rPr lang="en-US" dirty="0"/>
-              <a:t> </a:t>
-            </a:r>
-            <a:endParaRPr lang="en-US" b="1" dirty="0"/>
-          </a:p>
-          <a:p>
-            <a:r>
-              <a:rPr lang="en-US" b="1" dirty="0"/>
-              <a:t>Creating the </a:t>
-            </a:r>
-            <a:r>
-              <a:rPr lang="en-US" b="1" dirty="0" err="1"/>
-              <a:t>Unphishable</a:t>
-            </a:r>
-            <a:r>
-              <a:rPr lang="en-US" b="1" dirty="0"/>
-              <a:t> Security Key: How the FIDO U2F security key and </a:t>
-            </a:r>
-            <a:r>
-              <a:rPr lang="en-US" b="1" dirty="0" err="1"/>
-              <a:t>YubiKey</a:t>
-            </a:r>
-            <a:r>
-              <a:rPr lang="en-US" b="1" dirty="0"/>
-              <a:t> stop phishing and man-in-the-middle attacks </a:t>
-            </a:r>
-            <a:r>
-              <a:rPr lang="en-US" dirty="0">
+              <a:t>https://www.pcmag.com/feature/358289/two-factor-authentication-who-has-it-and-how-to-set-it-up</a:t>
+            </a:r>
+            <a:endParaRPr lang="en-US" sz="1600" dirty="0"/>
+          </a:p>
+          <a:p>
+            <a:r>
+              <a:rPr lang="en-US" sz="1600" b="1" dirty="0"/>
+              <a:t>Hackers beat 2-factor protection with automated phishing attacks </a:t>
+            </a:r>
+            <a:r>
+              <a:rPr lang="en-US" sz="1600" dirty="0">
                 <a:hlinkClick r:id="rId7"/>
               </a:rPr>
-              <a:t>www.yubico.com/2017/10/creating-unphishable-security-key/</a:t>
-            </a:r>
-            <a:endParaRPr lang="en-US" dirty="0"/>
-          </a:p>
-          <a:p>
-            <a:r>
-              <a:rPr lang="en-US" b="1" dirty="0"/>
-              <a:t>What is two-factor authentication, and which 2FA solutions are best?</a:t>
-            </a:r>
-            <a:br>
-              <a:rPr lang="en-US" b="1" dirty="0"/>
-            </a:br>
-            <a:r>
-              <a:rPr lang="en-US" dirty="0">
+              <a:t>https://mashable.com/article/hackers-beat-two-factor-authentication-2fa-phishing</a:t>
+            </a:r>
+            <a:r>
+              <a:rPr lang="en-US" sz="1600" dirty="0"/>
+              <a:t> </a:t>
+            </a:r>
+            <a:endParaRPr lang="en-US" sz="1600" b="1" dirty="0"/>
+          </a:p>
+          <a:p>
+            <a:r>
+              <a:rPr lang="en-US" sz="1600" b="1" dirty="0"/>
+              <a:t>Creating the </a:t>
+            </a:r>
+            <a:r>
+              <a:rPr lang="en-US" sz="1600" b="1" dirty="0" err="1"/>
+              <a:t>Unphishable</a:t>
+            </a:r>
+            <a:r>
+              <a:rPr lang="en-US" sz="1600" b="1" dirty="0"/>
+              <a:t> Security Key: How the FIDO U2F security key and </a:t>
+            </a:r>
+            <a:r>
+              <a:rPr lang="en-US" sz="1600" b="1" dirty="0" err="1"/>
+              <a:t>YubiKey</a:t>
+            </a:r>
+            <a:r>
+              <a:rPr lang="en-US" sz="1600" b="1" dirty="0"/>
+              <a:t> stop phishing and man-in-the-middle attacks </a:t>
+            </a:r>
+            <a:r>
+              <a:rPr lang="en-US" sz="1600" dirty="0">
                 <a:hlinkClick r:id="rId8"/>
               </a:rPr>
-              <a:t>https://www.pcworld.com/article/3225913/what-is-two-factor-authentication-and-which-2fa-apps-are-best.html</a:t>
-            </a:r>
-            <a:endParaRPr lang="en-US" dirty="0"/>
-          </a:p>
-          <a:p>
-            <a:r>
-              <a:rPr lang="en-US" b="1" dirty="0"/>
-              <a:t>Let's find the right </a:t>
-            </a:r>
-            <a:r>
-              <a:rPr lang="en-US" b="1" dirty="0" err="1"/>
-              <a:t>YubiKey</a:t>
-            </a:r>
-            <a:r>
-              <a:rPr lang="en-US" b="1" dirty="0"/>
-              <a:t> for you. </a:t>
-            </a:r>
-            <a:r>
-              <a:rPr lang="en-US" dirty="0">
+              <a:t>www.yubico.com/2017/10/creating-unphishable-security-key/</a:t>
+            </a:r>
+            <a:endParaRPr lang="en-US" sz="1600" dirty="0"/>
+          </a:p>
+          <a:p>
+            <a:r>
+              <a:rPr lang="en-US" sz="1600" b="1" dirty="0"/>
+              <a:t>What is two-factor authentication, and which 2FA solutions are </a:t>
+            </a:r>
+            <a:r>
+              <a:rPr lang="en-US" sz="1600" b="1" dirty="0" err="1"/>
+              <a:t>best?</a:t>
+            </a:r>
+            <a:r>
+              <a:rPr lang="en-US" sz="1600" dirty="0" err="1">
                 <a:hlinkClick r:id="rId9"/>
               </a:rPr>
-              <a:t>https://www.yubico.com/quiz/</a:t>
-            </a:r>
-            <a:endParaRPr lang="en-US" dirty="0"/>
-          </a:p>
-          <a:p>
-            <a:r>
-              <a:rPr lang="en-US" b="1" dirty="0"/>
-              <a:t>The Limits of SMS for 2-Factor Authentication </a:t>
-            </a:r>
-            <a:r>
-              <a:rPr lang="en-US" dirty="0">
+              <a:t>https</a:t>
+            </a:r>
+            <a:r>
+              <a:rPr lang="en-US" sz="1600" dirty="0">
+                <a:hlinkClick r:id="rId9"/>
+              </a:rPr>
+              <a:t>://www.pcworld.com/article/3225913/what-is-two-factor-authentication-and-which-2fa-apps-are-best.html</a:t>
+            </a:r>
+            <a:endParaRPr lang="en-US" sz="1600" dirty="0"/>
+          </a:p>
+          <a:p>
+            <a:r>
+              <a:rPr lang="en-US" sz="1600" b="1" dirty="0"/>
+              <a:t>Let's find the right </a:t>
+            </a:r>
+            <a:r>
+              <a:rPr lang="en-US" sz="1600" b="1" dirty="0" err="1"/>
+              <a:t>YubiKey</a:t>
+            </a:r>
+            <a:r>
+              <a:rPr lang="en-US" sz="1600" b="1" dirty="0"/>
+              <a:t> for you. </a:t>
+            </a:r>
+            <a:r>
+              <a:rPr lang="en-US" sz="1600" dirty="0">
                 <a:hlinkClick r:id="rId10"/>
               </a:rPr>
-              <a:t>https://krebsonsecurity.com/2016/09/the-limits-of-sms-for-2-factor-authentication/</a:t>
-            </a:r>
-            <a:endParaRPr lang="en-US" dirty="0"/>
-          </a:p>
-          <a:p>
-            <a:r>
-              <a:rPr lang="en-US" b="1" dirty="0"/>
-              <a:t>Major SMS security lapse is a reminder to use authenticator apps instead </a:t>
-            </a:r>
-            <a:r>
-              <a:rPr lang="en-US" dirty="0">
+              <a:t>https://www.yubico.com/quiz/</a:t>
+            </a:r>
+            <a:endParaRPr lang="en-US" sz="1600" dirty="0"/>
+          </a:p>
+          <a:p>
+            <a:r>
+              <a:rPr lang="en-US" sz="1600" b="1" dirty="0"/>
+              <a:t>The Limits of SMS for 2-Factor Authentication </a:t>
+            </a:r>
+            <a:r>
+              <a:rPr lang="en-US" sz="1600" dirty="0">
                 <a:hlinkClick r:id="rId11"/>
               </a:rPr>
+              <a:t>https://krebsonsecurity.com/2016/09/the-limits-of-sms-for-2-factor-authentication/</a:t>
+            </a:r>
+            <a:endParaRPr lang="en-US" sz="1600" dirty="0"/>
+          </a:p>
+          <a:p>
+            <a:r>
+              <a:rPr lang="en-US" sz="1600" b="1" dirty="0"/>
+              <a:t>Major SMS security lapse is a reminder to use authenticator apps instead </a:t>
+            </a:r>
+            <a:r>
+              <a:rPr lang="en-US" sz="1600" dirty="0">
+                <a:hlinkClick r:id="rId12"/>
+              </a:rPr>
               <a:t>https://www.theverge.com/2018/11/16/18098286/vovox-security-breach-two-factor-authentication-2fa-codes-exposed</a:t>
             </a:r>
-            <a:endParaRPr lang="en-US" dirty="0"/>
-          </a:p>
-          <a:p>
-            <a:endParaRPr lang="en-US" dirty="0"/>
+            <a:endParaRPr lang="en-US" sz="1600" dirty="0"/>
+          </a:p>
+          <a:p>
+            <a:r>
+              <a:rPr lang="en-US" sz="1600" b="1" dirty="0"/>
+              <a:t>Metro Bank targeted with 2FA-bypassing SS7 attacks </a:t>
+            </a:r>
+            <a:r>
+              <a:rPr lang="en-US" sz="1600" dirty="0">
+                <a:hlinkClick r:id="rId13"/>
+              </a:rPr>
+              <a:t>https://www.itpro.co.uk/security/32898/metro-bank-targeted-with-2fa-bypassing-ss7-attacks</a:t>
+            </a:r>
+            <a:endParaRPr lang="en-US" sz="1600" dirty="0"/>
           </a:p>
         </p:txBody>
       </p:sp>
@@ -7016,138 +7505,6 @@
 </file>
 
 <file path=ppt/slides/slide3.xml><?xml version="1.0" encoding="utf-8"?>
-<p:sld xmlns:a="http://schemas.openxmlformats.org/drawingml/2006/main" xmlns:r="http://schemas.openxmlformats.org/officeDocument/2006/relationships" xmlns:p="http://schemas.openxmlformats.org/presentationml/2006/main">
-  <p:cSld>
-    <p:spTree>
-      <p:nvGrpSpPr>
-        <p:cNvPr id="1" name=""/>
-        <p:cNvGrpSpPr/>
-        <p:nvPr/>
-      </p:nvGrpSpPr>
-      <p:grpSpPr>
-        <a:xfrm>
-          <a:off x="0" y="0"/>
-          <a:ext cx="0" cy="0"/>
-          <a:chOff x="0" y="0"/>
-          <a:chExt cx="0" cy="0"/>
-        </a:xfrm>
-      </p:grpSpPr>
-      <p:sp>
-        <p:nvSpPr>
-          <p:cNvPr id="2" name="Title 1">
-            <a:extLst>
-              <a:ext uri="{FF2B5EF4-FFF2-40B4-BE49-F238E27FC236}">
-                <a16:creationId xmlns:a16="http://schemas.microsoft.com/office/drawing/2014/main" id="{D0CBD092-444D-485B-B077-AE37DB7967F1}"/>
-              </a:ext>
-            </a:extLst>
-          </p:cNvPr>
-          <p:cNvSpPr>
-            <a:spLocks noGrp="1"/>
-          </p:cNvSpPr>
-          <p:nvPr>
-            <p:ph type="title"/>
-          </p:nvPr>
-        </p:nvSpPr>
-        <p:spPr/>
-        <p:txBody>
-          <a:bodyPr/>
-          <a:lstStyle/>
-          <a:p>
-            <a:r>
-              <a:rPr lang="en-US" dirty="0"/>
-              <a:t>Awareness is the best Digital Defense</a:t>
-            </a:r>
-          </a:p>
-        </p:txBody>
-      </p:sp>
-      <p:sp>
-        <p:nvSpPr>
-          <p:cNvPr id="3" name="Content Placeholder 2">
-            <a:extLst>
-              <a:ext uri="{FF2B5EF4-FFF2-40B4-BE49-F238E27FC236}">
-                <a16:creationId xmlns:a16="http://schemas.microsoft.com/office/drawing/2014/main" id="{65B32B1F-E0DF-456C-B7E0-F6CB2CBEA651}"/>
-              </a:ext>
-            </a:extLst>
-          </p:cNvPr>
-          <p:cNvSpPr>
-            <a:spLocks noGrp="1"/>
-          </p:cNvSpPr>
-          <p:nvPr>
-            <p:ph idx="1"/>
-          </p:nvPr>
-        </p:nvSpPr>
-        <p:spPr/>
-        <p:txBody>
-          <a:bodyPr>
-            <a:normAutofit fontScale="92500" lnSpcReduction="20000"/>
-          </a:bodyPr>
-          <a:lstStyle/>
-          <a:p>
-            <a:pPr marL="0" indent="0" fontAlgn="base">
-              <a:buNone/>
-            </a:pPr>
-            <a:r>
-              <a:rPr lang="en-US" sz="5400" dirty="0"/>
-              <a:t>“If you don’t understand the basics of computer security, you shouldn’t be allowed to bank on the Internet.”</a:t>
-            </a:r>
-            <a:br>
-              <a:rPr lang="en-US" sz="5400" dirty="0"/>
-            </a:br>
-            <a:endParaRPr lang="en-US" sz="5400" dirty="0"/>
-          </a:p>
-          <a:p>
-            <a:pPr marL="0" indent="0" fontAlgn="base">
-              <a:buNone/>
-            </a:pPr>
-            <a:endParaRPr lang="en-US" sz="5400" dirty="0"/>
-          </a:p>
-          <a:p>
-            <a:pPr marL="0" indent="0" fontAlgn="base">
-              <a:buNone/>
-            </a:pPr>
-            <a:endParaRPr lang="en-US" sz="5400" dirty="0"/>
-          </a:p>
-          <a:p>
-            <a:pPr lvl="1" fontAlgn="base"/>
-            <a:r>
-              <a:rPr lang="en-US" dirty="0"/>
-              <a:t>Brad Jones, </a:t>
-            </a:r>
-            <a:r>
-              <a:rPr lang="en-US" dirty="0" err="1"/>
-              <a:t>DigitalTrends</a:t>
-            </a:r>
-            <a:r>
-              <a:rPr lang="en-US" dirty="0"/>
-              <a:t>, 2017 </a:t>
-            </a:r>
-            <a:br>
-              <a:rPr lang="en-US" dirty="0"/>
-            </a:br>
-            <a:r>
-              <a:rPr lang="en-US" sz="2200" dirty="0">
-                <a:hlinkClick r:id="rId2"/>
-              </a:rPr>
-              <a:t>https://www.digitaltrends.com/computing/why-2-factor-security-is-flawed/</a:t>
-            </a:r>
-            <a:endParaRPr lang="en-US" sz="1900" dirty="0"/>
-          </a:p>
-        </p:txBody>
-      </p:sp>
-    </p:spTree>
-    <p:extLst>
-      <p:ext uri="{BB962C8B-B14F-4D97-AF65-F5344CB8AC3E}">
-        <p14:creationId xmlns:p14="http://schemas.microsoft.com/office/powerpoint/2010/main" val="3167071335"/>
-      </p:ext>
-    </p:extLst>
-  </p:cSld>
-  <p:clrMapOvr>
-    <a:masterClrMapping/>
-  </p:clrMapOvr>
-</p:sld>
-</file>
-
-<file path=ppt/slides/slide4.xml><?xml version="1.0" encoding="utf-8"?>
 <p:sld xmlns:a="http://schemas.openxmlformats.org/drawingml/2006/main" xmlns:r="http://schemas.openxmlformats.org/officeDocument/2006/relationships" xmlns:p="http://schemas.openxmlformats.org/presentationml/2006/main">
   <p:cSld>
     <p:spTree>
@@ -7758,6 +8115,102 @@
 </p:sld>
 </file>
 
+<file path=ppt/slides/slide4.xml><?xml version="1.0" encoding="utf-8"?>
+<p:sld xmlns:a="http://schemas.openxmlformats.org/drawingml/2006/main" xmlns:r="http://schemas.openxmlformats.org/officeDocument/2006/relationships" xmlns:p="http://schemas.openxmlformats.org/presentationml/2006/main">
+  <p:cSld>
+    <p:spTree>
+      <p:nvGrpSpPr>
+        <p:cNvPr id="1" name=""/>
+        <p:cNvGrpSpPr/>
+        <p:nvPr/>
+      </p:nvGrpSpPr>
+      <p:grpSpPr>
+        <a:xfrm>
+          <a:off x="0" y="0"/>
+          <a:ext cx="0" cy="0"/>
+          <a:chOff x="0" y="0"/>
+          <a:chExt cx="0" cy="0"/>
+        </a:xfrm>
+      </p:grpSpPr>
+      <p:sp>
+        <p:nvSpPr>
+          <p:cNvPr id="2" name="Title 1">
+            <a:extLst>
+              <a:ext uri="{FF2B5EF4-FFF2-40B4-BE49-F238E27FC236}">
+                <a16:creationId xmlns:a16="http://schemas.microsoft.com/office/drawing/2014/main" id="{D0CBD092-444D-485B-B077-AE37DB7967F1}"/>
+              </a:ext>
+            </a:extLst>
+          </p:cNvPr>
+          <p:cNvSpPr>
+            <a:spLocks noGrp="1"/>
+          </p:cNvSpPr>
+          <p:nvPr>
+            <p:ph type="title"/>
+          </p:nvPr>
+        </p:nvSpPr>
+        <p:spPr/>
+        <p:txBody>
+          <a:bodyPr/>
+          <a:lstStyle/>
+          <a:p>
+            <a:r>
+              <a:rPr lang="en-US" dirty="0"/>
+              <a:t> </a:t>
+            </a:r>
+          </a:p>
+        </p:txBody>
+      </p:sp>
+      <p:sp>
+        <p:nvSpPr>
+          <p:cNvPr id="3" name="Content Placeholder 2">
+            <a:extLst>
+              <a:ext uri="{FF2B5EF4-FFF2-40B4-BE49-F238E27FC236}">
+                <a16:creationId xmlns:a16="http://schemas.microsoft.com/office/drawing/2014/main" id="{65B32B1F-E0DF-456C-B7E0-F6CB2CBEA651}"/>
+              </a:ext>
+            </a:extLst>
+          </p:cNvPr>
+          <p:cNvSpPr>
+            <a:spLocks noGrp="1"/>
+          </p:cNvSpPr>
+          <p:nvPr>
+            <p:ph idx="1"/>
+          </p:nvPr>
+        </p:nvSpPr>
+        <p:spPr>
+          <a:xfrm>
+            <a:off x="838200" y="2914649"/>
+            <a:ext cx="10515600" cy="3262313"/>
+          </a:xfrm>
+        </p:spPr>
+        <p:txBody>
+          <a:bodyPr>
+            <a:normAutofit lnSpcReduction="10000"/>
+          </a:bodyPr>
+          <a:lstStyle/>
+          <a:p>
+            <a:pPr marL="0" indent="0">
+              <a:buNone/>
+            </a:pPr>
+            <a:r>
+              <a:rPr lang="en-US" sz="6000" dirty="0"/>
+              <a:t>Password length and complexity are useless once some website or service leaks your username/email and password.</a:t>
+            </a:r>
+          </a:p>
+        </p:txBody>
+      </p:sp>
+    </p:spTree>
+    <p:extLst>
+      <p:ext uri="{BB962C8B-B14F-4D97-AF65-F5344CB8AC3E}">
+        <p14:creationId xmlns:p14="http://schemas.microsoft.com/office/powerpoint/2010/main" val="3648181566"/>
+      </p:ext>
+    </p:extLst>
+  </p:cSld>
+  <p:clrMapOvr>
+    <a:masterClrMapping/>
+  </p:clrMapOvr>
+</p:sld>
+</file>
+
 <file path=ppt/slides/slide5.xml><?xml version="1.0" encoding="utf-8"?>
 <p:sld xmlns:a="http://schemas.openxmlformats.org/drawingml/2006/main" xmlns:r="http://schemas.openxmlformats.org/officeDocument/2006/relationships" xmlns:p="http://schemas.openxmlformats.org/presentationml/2006/main">
   <p:cSld>
@@ -7798,7 +8251,7 @@
           <a:p>
             <a:r>
               <a:rPr lang="en-US" dirty="0"/>
-              <a:t> </a:t>
+              <a:t>Password Hygiene </a:t>
             </a:r>
           </a:p>
         </p:txBody>
@@ -7821,30 +8274,62 @@
         </p:nvSpPr>
         <p:spPr>
           <a:xfrm>
-            <a:off x="838200" y="2914649"/>
-            <a:ext cx="10515600" cy="3262313"/>
+            <a:off x="838200" y="1463675"/>
+            <a:ext cx="10515600" cy="5156200"/>
           </a:xfrm>
         </p:spPr>
         <p:txBody>
           <a:bodyPr>
-            <a:normAutofit lnSpcReduction="10000"/>
+            <a:normAutofit fontScale="92500" lnSpcReduction="20000"/>
           </a:bodyPr>
           <a:lstStyle/>
           <a:p>
-            <a:pPr marL="0" indent="0">
-              <a:buNone/>
-            </a:pPr>
-            <a:r>
-              <a:rPr lang="en-US" sz="6000" dirty="0"/>
-              <a:t>Password length and complexity are useless once some website or service leaks your username/email and password.</a:t>
-            </a:r>
+            <a:r>
+              <a:rPr lang="en-US" sz="4800" dirty="0"/>
+              <a:t>Has your email been part of any password leaks? </a:t>
+            </a:r>
+            <a:r>
+              <a:rPr lang="en-US" sz="4400" dirty="0">
+                <a:hlinkClick r:id="rId2"/>
+              </a:rPr>
+              <a:t>haveibeenpwned.com</a:t>
+            </a:r>
+            <a:endParaRPr lang="en-US" sz="4400" dirty="0"/>
+          </a:p>
+          <a:p>
+            <a:r>
+              <a:rPr lang="en-US" sz="4400" dirty="0"/>
+              <a:t>Spoiler alert: Almost Certainly</a:t>
+            </a:r>
+          </a:p>
+          <a:p>
+            <a:r>
+              <a:rPr lang="en-US" sz="4400" dirty="0"/>
+              <a:t>“People take lists like these that contain our email addresses and passwords then they attempt to see where else they work. </a:t>
+            </a:r>
+            <a:r>
+              <a:rPr lang="en-US" sz="4400" b="1" dirty="0"/>
+              <a:t>The success of this approach is predicated on the fact that people reuse the same credentials on multiple services.</a:t>
+            </a:r>
+            <a:r>
+              <a:rPr lang="en-US" sz="4400" dirty="0"/>
+              <a:t>” </a:t>
+            </a:r>
+            <a:br>
+              <a:rPr lang="en-US" sz="4400" dirty="0"/>
+            </a:br>
+            <a:r>
+              <a:rPr lang="en-US" sz="3200" dirty="0"/>
+              <a:t>–Troy Hunt, haveibeenpwned.com</a:t>
+            </a:r>
+            <a:endParaRPr lang="en-US" sz="4400" dirty="0"/>
           </a:p>
         </p:txBody>
       </p:sp>
     </p:spTree>
     <p:extLst>
       <p:ext uri="{BB962C8B-B14F-4D97-AF65-F5344CB8AC3E}">
-        <p14:creationId xmlns:p14="http://schemas.microsoft.com/office/powerpoint/2010/main" val="3648181566"/>
+        <p14:creationId xmlns:p14="http://schemas.microsoft.com/office/powerpoint/2010/main" val="3987729892"/>
       </p:ext>
     </p:extLst>
   </p:cSld>
@@ -7915,58 +8400,50 @@
             <p:ph idx="1"/>
           </p:nvPr>
         </p:nvSpPr>
-        <p:spPr>
-          <a:xfrm>
-            <a:off x="838200" y="1463675"/>
-            <a:ext cx="10515600" cy="5156200"/>
-          </a:xfrm>
-        </p:spPr>
+        <p:spPr/>
         <p:txBody>
           <a:bodyPr>
-            <a:normAutofit lnSpcReduction="10000"/>
+            <a:normAutofit/>
           </a:bodyPr>
           <a:lstStyle/>
           <a:p>
             <a:r>
-              <a:rPr lang="en-US" sz="4800" dirty="0"/>
-              <a:t>Has your email been part of any password leaks? </a:t>
-            </a:r>
-            <a:r>
-              <a:rPr lang="en-US" sz="4400" dirty="0">
-                <a:hlinkClick r:id="rId2"/>
-              </a:rPr>
-              <a:t>haveibeenpwned.com</a:t>
-            </a:r>
-            <a:endParaRPr lang="en-US" sz="4400" dirty="0"/>
-          </a:p>
-          <a:p>
-            <a:r>
               <a:rPr lang="en-US" sz="4400" dirty="0"/>
-              <a:t>“People take lists like these that contain our email addresses and passwords then they attempt to see where else they work. </a:t>
-            </a:r>
-            <a:r>
-              <a:rPr lang="en-US" sz="4400" b="1" dirty="0"/>
-              <a:t>The success of this approach is predicated on the fact that people reuse the same credentials on multiple services.</a:t>
-            </a:r>
+              <a:t>True now and always:</a:t>
+            </a:r>
+          </a:p>
+          <a:p>
             <a:r>
               <a:rPr lang="en-US" sz="4400" dirty="0"/>
-              <a:t>” </a:t>
-            </a:r>
-            <a:br>
+              <a:t>Password length &gt; Password complexity</a:t>
+            </a:r>
+          </a:p>
+          <a:p>
+            <a:pPr lvl="1"/>
+            <a:r>
+              <a:rPr lang="en-US" sz="4000" dirty="0"/>
+              <a:t>Password complexity leads directly to bad security habits (post-it notes or easy to guess)</a:t>
+            </a:r>
+          </a:p>
+          <a:p>
+            <a:r>
               <a:rPr lang="en-US" sz="4400" dirty="0"/>
-            </a:br>
-            <a:r>
-              <a:rPr lang="en-US" sz="3200" dirty="0"/>
-              <a:t>–Troy Hunt, haveibeenpwned.com</a:t>
-            </a:r>
-            <a:endParaRPr lang="en-US" sz="4400" dirty="0"/>
+              <a:t>Password uniqueness &gt; Password length</a:t>
+            </a:r>
+          </a:p>
+          <a:p>
+            <a:r>
+              <a:rPr lang="en-US" sz="4400" dirty="0"/>
+              <a:t>Passwords alone are terrible security</a:t>
+            </a:r>
+            <a:endParaRPr lang="en-US" sz="4000" dirty="0"/>
           </a:p>
         </p:txBody>
       </p:sp>
     </p:spTree>
     <p:extLst>
       <p:ext uri="{BB962C8B-B14F-4D97-AF65-F5344CB8AC3E}">
-        <p14:creationId xmlns:p14="http://schemas.microsoft.com/office/powerpoint/2010/main" val="3987729892"/>
+        <p14:creationId xmlns:p14="http://schemas.microsoft.com/office/powerpoint/2010/main" val="3735776281"/>
       </p:ext>
     </p:extLst>
   </p:cSld>
@@ -8016,7 +8493,7 @@
           <a:p>
             <a:r>
               <a:rPr lang="en-US" dirty="0"/>
-              <a:t>Password Hygiene </a:t>
+              <a:t>Your Email Account &gt; Your Bank Account</a:t>
             </a:r>
           </a:p>
         </p:txBody>
@@ -8044,43 +8521,29 @@
           </a:bodyPr>
           <a:lstStyle/>
           <a:p>
-            <a:r>
-              <a:rPr lang="en-US" sz="4400" dirty="0"/>
-              <a:t>True now and always:</a:t>
-            </a:r>
-          </a:p>
-          <a:p>
-            <a:r>
-              <a:rPr lang="en-US" sz="4400" dirty="0"/>
-              <a:t>Password length &gt; password complexity</a:t>
-            </a:r>
-          </a:p>
-          <a:p>
-            <a:pPr lvl="1"/>
-            <a:r>
-              <a:rPr lang="en-US" sz="4000" dirty="0"/>
-              <a:t>Password complexity leads directly to bad security habits (post-it notes or easy to guess)</a:t>
-            </a:r>
-          </a:p>
-          <a:p>
-            <a:r>
-              <a:rPr lang="en-US" sz="4400" dirty="0"/>
-              <a:t>Password uniqueness &gt; password length</a:t>
-            </a:r>
-          </a:p>
-          <a:p>
-            <a:r>
-              <a:rPr lang="en-US" sz="4400" dirty="0"/>
-              <a:t>Passwords alone are terrible security</a:t>
-            </a:r>
-            <a:endParaRPr lang="en-US" sz="4000" dirty="0"/>
+            <a:pPr marL="0" indent="0">
+              <a:buNone/>
+            </a:pPr>
+            <a:r>
+              <a:rPr lang="en-US" sz="5400" dirty="0"/>
+              <a:t>Having your email hacked can be worse than having your bank account hacked.</a:t>
+            </a:r>
+          </a:p>
+          <a:p>
+            <a:pPr marL="0" indent="0">
+              <a:buNone/>
+            </a:pPr>
+            <a:r>
+              <a:rPr lang="en-US" sz="5400" dirty="0"/>
+              <a:t>Your email account is a single point of failure for many sites. </a:t>
+            </a:r>
           </a:p>
         </p:txBody>
       </p:sp>
     </p:spTree>
     <p:extLst>
       <p:ext uri="{BB962C8B-B14F-4D97-AF65-F5344CB8AC3E}">
-        <p14:creationId xmlns:p14="http://schemas.microsoft.com/office/powerpoint/2010/main" val="3735776281"/>
+        <p14:creationId xmlns:p14="http://schemas.microsoft.com/office/powerpoint/2010/main" val="1067588744"/>
       </p:ext>
     </p:extLst>
   </p:cSld>
@@ -8130,7 +8593,7 @@
           <a:p>
             <a:r>
               <a:rPr lang="en-US" dirty="0"/>
-              <a:t>Your Email Account &gt; Your Bank Account</a:t>
+              <a:t>Password Managers </a:t>
             </a:r>
           </a:p>
         </p:txBody>
@@ -8158,29 +8621,47 @@
           </a:bodyPr>
           <a:lstStyle/>
           <a:p>
-            <a:pPr marL="0" indent="0">
-              <a:buNone/>
-            </a:pPr>
-            <a:r>
-              <a:rPr lang="en-US" sz="5400" dirty="0"/>
-              <a:t>Having your email hacked can be worse than having your bank account hacked.</a:t>
-            </a:r>
-          </a:p>
-          <a:p>
-            <a:pPr marL="0" indent="0">
-              <a:buNone/>
-            </a:pPr>
-            <a:r>
-              <a:rPr lang="en-US" sz="5400" dirty="0"/>
-              <a:t>Your email account is a single point of failure for many sites. </a:t>
-            </a:r>
+            <a:r>
+              <a:rPr lang="en-US" sz="4000" dirty="0"/>
+              <a:t>Great for generating and storing secure passwords, so that you don’t have to remember a unique password for each site. These options are popular, secure, and inexpensive:</a:t>
+            </a:r>
+          </a:p>
+          <a:p>
+            <a:pPr lvl="2"/>
+            <a:r>
+              <a:rPr lang="en-US" sz="3200" dirty="0"/>
+              <a:t>LastPass</a:t>
+            </a:r>
+          </a:p>
+          <a:p>
+            <a:pPr lvl="2"/>
+            <a:r>
+              <a:rPr lang="en-US" sz="3200" dirty="0"/>
+              <a:t>1Password</a:t>
+            </a:r>
+          </a:p>
+          <a:p>
+            <a:pPr lvl="2"/>
+            <a:r>
+              <a:rPr lang="en-US" sz="3200" dirty="0" err="1"/>
+              <a:t>Dashlane</a:t>
+            </a:r>
+            <a:endParaRPr lang="en-US" sz="3200" dirty="0"/>
+          </a:p>
+          <a:p>
+            <a:pPr lvl="2"/>
+            <a:r>
+              <a:rPr lang="en-US" sz="3200" dirty="0" err="1"/>
+              <a:t>KeePassX</a:t>
+            </a:r>
+            <a:endParaRPr lang="en-US" sz="3200" dirty="0"/>
           </a:p>
         </p:txBody>
       </p:sp>
     </p:spTree>
     <p:extLst>
       <p:ext uri="{BB962C8B-B14F-4D97-AF65-F5344CB8AC3E}">
-        <p14:creationId xmlns:p14="http://schemas.microsoft.com/office/powerpoint/2010/main" val="1067588744"/>
+        <p14:creationId xmlns:p14="http://schemas.microsoft.com/office/powerpoint/2010/main" val="2363797164"/>
       </p:ext>
     </p:extLst>
   </p:cSld>
@@ -8254,49 +8735,58 @@
         <p:spPr/>
         <p:txBody>
           <a:bodyPr>
-            <a:normAutofit fontScale="92500" lnSpcReduction="10000"/>
+            <a:normAutofit/>
           </a:bodyPr>
           <a:lstStyle/>
           <a:p>
             <a:r>
+              <a:rPr lang="en-US" sz="4000" u="sng" dirty="0"/>
+              <a:t>Basic idea</a:t>
+            </a:r>
+            <a:r>
               <a:rPr lang="en-US" sz="4000" dirty="0"/>
-              <a:t>Great for generating and storing secure passwords, so that you don’t have to remember a unique password for each site. </a:t>
-            </a:r>
-          </a:p>
-          <a:p>
-            <a:pPr lvl="2"/>
-            <a:r>
-              <a:rPr lang="en-US" sz="3200" dirty="0"/>
-              <a:t>LastPass</a:t>
-            </a:r>
-          </a:p>
-          <a:p>
-            <a:pPr lvl="2"/>
-            <a:r>
-              <a:rPr lang="en-US" sz="3200" dirty="0"/>
-              <a:t>1Password</a:t>
-            </a:r>
-          </a:p>
-          <a:p>
-            <a:pPr lvl="2"/>
-            <a:r>
-              <a:rPr lang="en-US" sz="3200" dirty="0" err="1"/>
-              <a:t>Dashlane</a:t>
-            </a:r>
-            <a:endParaRPr lang="en-US" sz="3200" dirty="0"/>
-          </a:p>
-          <a:p>
-            <a:pPr lvl="2"/>
-            <a:r>
-              <a:rPr lang="en-US" sz="3200" dirty="0" err="1"/>
-              <a:t>KeePassX</a:t>
-            </a:r>
-            <a:endParaRPr lang="en-US" sz="3200" dirty="0"/>
-          </a:p>
-          <a:p>
-            <a:r>
-              <a:rPr lang="en-US" sz="3600" dirty="0"/>
-              <a:t>Basic idea: remember one really super long password that you never re-use anywhere else to unlock everything else</a:t>
+              <a:t>: You have </a:t>
+            </a:r>
+            <a:r>
+              <a:rPr lang="en-US" sz="4000" b="1" dirty="0"/>
+              <a:t>one unique super password</a:t>
+            </a:r>
+            <a:r>
+              <a:rPr lang="en-US" sz="4000" dirty="0"/>
+              <a:t> to unlock everything else. </a:t>
+            </a:r>
+            <a:r>
+              <a:rPr lang="en-US" dirty="0"/>
+              <a:t>Obviously, don’t re-use it.</a:t>
+            </a:r>
+            <a:endParaRPr lang="en-US" sz="4000" dirty="0"/>
+          </a:p>
+          <a:p>
+            <a:r>
+              <a:rPr lang="en-US" sz="4000" u="sng" dirty="0"/>
+              <a:t>Pro</a:t>
+            </a:r>
+            <a:r>
+              <a:rPr lang="en-US" sz="4000" dirty="0"/>
+              <a:t>: All your passwords are super long, super strong, unique, and available to you anywhere</a:t>
+            </a:r>
+          </a:p>
+          <a:p>
+            <a:r>
+              <a:rPr lang="en-US" sz="4000" u="sng" dirty="0"/>
+              <a:t>Con</a:t>
+            </a:r>
+            <a:r>
+              <a:rPr lang="en-US" sz="4000" dirty="0"/>
+              <a:t>: forget the </a:t>
+            </a:r>
+            <a:r>
+              <a:rPr lang="en-US" sz="4000" b="1" dirty="0"/>
+              <a:t>one unique super password</a:t>
+            </a:r>
+            <a:r>
+              <a:rPr lang="en-US" sz="4000" dirty="0"/>
+              <a:t> despite typing it in all the time, and they cannot decrypt your passwords for you</a:t>
             </a:r>
           </a:p>
         </p:txBody>
@@ -8304,7 +8794,7 @@
     </p:spTree>
     <p:extLst>
       <p:ext uri="{BB962C8B-B14F-4D97-AF65-F5344CB8AC3E}">
-        <p14:creationId xmlns:p14="http://schemas.microsoft.com/office/powerpoint/2010/main" val="2363797164"/>
+        <p14:creationId xmlns:p14="http://schemas.microsoft.com/office/powerpoint/2010/main" val="2001328530"/>
       </p:ext>
     </p:extLst>
   </p:cSld>

</xml_diff>